<commit_message>
add objective to presentation
</commit_message>
<xml_diff>
--- a/Lapack/Apresentação Lapack Computação Científica.pptx
+++ b/Lapack/Apresentação Lapack Computação Científica.pptx
@@ -15,16 +15,17 @@
     <p:sldId id="260" r:id="rId9"/>
     <p:sldId id="261" r:id="rId10"/>
     <p:sldId id="262" r:id="rId11"/>
+    <p:sldId id="263" r:id="rId12"/>
   </p:sldIdLst>
   <p:sldSz cy="6858000" cx="12192000"/>
   <p:notesSz cx="6858000" cy="9144000"/>
   <p:embeddedFontLst>
     <p:embeddedFont>
       <p:font typeface="Fira Sans"/>
-      <p:regular r:id="rId12"/>
-      <p:bold r:id="rId13"/>
-      <p:italic r:id="rId14"/>
-      <p:boldItalic r:id="rId15"/>
+      <p:regular r:id="rId13"/>
+      <p:bold r:id="rId14"/>
+      <p:italic r:id="rId15"/>
+      <p:boldItalic r:id="rId16"/>
     </p:embeddedFont>
   </p:embeddedFontLst>
   <p:defaultTextStyle>
@@ -1545,7 +1546,7 @@
       </p:grpSpPr>
       <p:sp>
         <p:nvSpPr>
-          <p:cNvPr id="102" name="Google Shape;102;gebf4379cbf_0_13:notes"/>
+          <p:cNvPr id="102" name="Google Shape;102;g12610c3b561_0_0:notes"/>
           <p:cNvSpPr/>
           <p:nvPr>
             <p:ph idx="2" type="sldImg"/>
@@ -1580,7 +1581,7 @@
       </p:sp>
       <p:sp>
         <p:nvSpPr>
-          <p:cNvPr id="103" name="Google Shape;103;gebf4379cbf_0_13:notes"/>
+          <p:cNvPr id="103" name="Google Shape;103;g12610c3b561_0_0:notes"/>
           <p:cNvSpPr txBox="1"/>
           <p:nvPr>
             <p:ph idx="1" type="body"/>
@@ -1619,7 +1620,7 @@
       </p:sp>
       <p:sp>
         <p:nvSpPr>
-          <p:cNvPr id="104" name="Google Shape;104;gebf4379cbf_0_13:notes"/>
+          <p:cNvPr id="104" name="Google Shape;104;g12610c3b561_0_0:notes"/>
           <p:cNvSpPr txBox="1"/>
           <p:nvPr>
             <p:ph idx="12" type="sldNum"/>
@@ -1674,7 +1675,7 @@
   <p:cSld>
     <p:spTree>
       <p:nvGrpSpPr>
-        <p:cNvPr id="112" name="Shape 112"/>
+        <p:cNvPr id="109" name="Shape 109"/>
         <p:cNvGrpSpPr/>
         <p:nvPr/>
       </p:nvGrpSpPr>
@@ -1688,7 +1689,7 @@
       </p:grpSpPr>
       <p:sp>
         <p:nvSpPr>
-          <p:cNvPr id="113" name="Google Shape;113;g1224e3e2fde_0_6:notes"/>
+          <p:cNvPr id="110" name="Google Shape;110;gebf4379cbf_0_13:notes"/>
           <p:cNvSpPr/>
           <p:nvPr>
             <p:ph idx="2" type="sldImg"/>
@@ -1723,7 +1724,7 @@
       </p:sp>
       <p:sp>
         <p:nvSpPr>
-          <p:cNvPr id="114" name="Google Shape;114;g1224e3e2fde_0_6:notes"/>
+          <p:cNvPr id="111" name="Google Shape;111;gebf4379cbf_0_13:notes"/>
           <p:cNvSpPr txBox="1"/>
           <p:nvPr>
             <p:ph idx="1" type="body"/>
@@ -1762,7 +1763,7 @@
       </p:sp>
       <p:sp>
         <p:nvSpPr>
-          <p:cNvPr id="115" name="Google Shape;115;g1224e3e2fde_0_6:notes"/>
+          <p:cNvPr id="112" name="Google Shape;112;gebf4379cbf_0_13:notes"/>
           <p:cNvSpPr txBox="1"/>
           <p:nvPr>
             <p:ph idx="12" type="sldNum"/>
@@ -1817,7 +1818,7 @@
   <p:cSld>
     <p:spTree>
       <p:nvGrpSpPr>
-        <p:cNvPr id="123" name="Shape 123"/>
+        <p:cNvPr id="120" name="Shape 120"/>
         <p:cNvGrpSpPr/>
         <p:nvPr/>
       </p:nvGrpSpPr>
@@ -1831,7 +1832,7 @@
       </p:grpSpPr>
       <p:sp>
         <p:nvSpPr>
-          <p:cNvPr id="124" name="Google Shape;124;g1224e3e2fde_0_19:notes"/>
+          <p:cNvPr id="121" name="Google Shape;121;g1224e3e2fde_0_6:notes"/>
           <p:cNvSpPr/>
           <p:nvPr>
             <p:ph idx="2" type="sldImg"/>
@@ -1866,7 +1867,7 @@
       </p:sp>
       <p:sp>
         <p:nvSpPr>
-          <p:cNvPr id="125" name="Google Shape;125;g1224e3e2fde_0_19:notes"/>
+          <p:cNvPr id="122" name="Google Shape;122;g1224e3e2fde_0_6:notes"/>
           <p:cNvSpPr txBox="1"/>
           <p:nvPr>
             <p:ph idx="1" type="body"/>
@@ -1905,7 +1906,7 @@
       </p:sp>
       <p:sp>
         <p:nvSpPr>
-          <p:cNvPr id="126" name="Google Shape;126;g1224e3e2fde_0_19:notes"/>
+          <p:cNvPr id="123" name="Google Shape;123;g1224e3e2fde_0_6:notes"/>
           <p:cNvSpPr txBox="1"/>
           <p:nvPr>
             <p:ph idx="12" type="sldNum"/>
@@ -1960,7 +1961,7 @@
   <p:cSld>
     <p:spTree>
       <p:nvGrpSpPr>
-        <p:cNvPr id="133" name="Shape 133"/>
+        <p:cNvPr id="131" name="Shape 131"/>
         <p:cNvGrpSpPr/>
         <p:nvPr/>
       </p:nvGrpSpPr>
@@ -1974,7 +1975,7 @@
       </p:grpSpPr>
       <p:sp>
         <p:nvSpPr>
-          <p:cNvPr id="134" name="Google Shape;134;g1224e3e2fde_0_39:notes"/>
+          <p:cNvPr id="132" name="Google Shape;132;g1224e3e2fde_0_19:notes"/>
           <p:cNvSpPr/>
           <p:nvPr>
             <p:ph idx="2" type="sldImg"/>
@@ -2009,7 +2010,7 @@
       </p:sp>
       <p:sp>
         <p:nvSpPr>
-          <p:cNvPr id="135" name="Google Shape;135;g1224e3e2fde_0_39:notes"/>
+          <p:cNvPr id="133" name="Google Shape;133;g1224e3e2fde_0_19:notes"/>
           <p:cNvSpPr txBox="1"/>
           <p:nvPr>
             <p:ph idx="1" type="body"/>
@@ -2048,7 +2049,7 @@
       </p:sp>
       <p:sp>
         <p:nvSpPr>
-          <p:cNvPr id="136" name="Google Shape;136;g1224e3e2fde_0_39:notes"/>
+          <p:cNvPr id="134" name="Google Shape;134;g1224e3e2fde_0_19:notes"/>
           <p:cNvSpPr txBox="1"/>
           <p:nvPr>
             <p:ph idx="12" type="sldNum"/>
@@ -2076,6 +2077,10 @@
               <a:spcAft>
                 <a:spcPts val="0"/>
               </a:spcAft>
+              <a:buClr>
+                <a:srgbClr val="000000"/>
+              </a:buClr>
+              <a:buFont typeface="Arial"/>
               <a:buNone/>
             </a:pPr>
             <a:fld id="{00000000-1234-1234-1234-123412341234}" type="slidenum">
@@ -2099,7 +2104,7 @@
   <p:cSld>
     <p:spTree>
       <p:nvGrpSpPr>
-        <p:cNvPr id="143" name="Shape 143"/>
+        <p:cNvPr id="141" name="Shape 141"/>
         <p:cNvGrpSpPr/>
         <p:nvPr/>
       </p:nvGrpSpPr>
@@ -2113,7 +2118,7 @@
       </p:grpSpPr>
       <p:sp>
         <p:nvSpPr>
-          <p:cNvPr id="144" name="Google Shape;144;g1224e3e2fde_0_59:notes"/>
+          <p:cNvPr id="142" name="Google Shape;142;g1224e3e2fde_0_39:notes"/>
           <p:cNvSpPr/>
           <p:nvPr>
             <p:ph idx="2" type="sldImg"/>
@@ -2148,7 +2153,7 @@
       </p:sp>
       <p:sp>
         <p:nvSpPr>
-          <p:cNvPr id="145" name="Google Shape;145;g1224e3e2fde_0_59:notes"/>
+          <p:cNvPr id="143" name="Google Shape;143;g1224e3e2fde_0_39:notes"/>
           <p:cNvSpPr txBox="1"/>
           <p:nvPr>
             <p:ph idx="1" type="body"/>
@@ -2187,7 +2192,7 @@
       </p:sp>
       <p:sp>
         <p:nvSpPr>
-          <p:cNvPr id="146" name="Google Shape;146;g1224e3e2fde_0_59:notes"/>
+          <p:cNvPr id="144" name="Google Shape;144;g1224e3e2fde_0_39:notes"/>
           <p:cNvSpPr txBox="1"/>
           <p:nvPr>
             <p:ph idx="12" type="sldNum"/>
@@ -2238,7 +2243,7 @@
   <p:cSld>
     <p:spTree>
       <p:nvGrpSpPr>
-        <p:cNvPr id="153" name="Shape 153"/>
+        <p:cNvPr id="151" name="Shape 151"/>
         <p:cNvGrpSpPr/>
         <p:nvPr/>
       </p:nvGrpSpPr>
@@ -2252,7 +2257,7 @@
       </p:grpSpPr>
       <p:sp>
         <p:nvSpPr>
-          <p:cNvPr id="154" name="Google Shape;154;g1224e3e2fde_0_72:notes"/>
+          <p:cNvPr id="152" name="Google Shape;152;g1224e3e2fde_0_59:notes"/>
           <p:cNvSpPr/>
           <p:nvPr>
             <p:ph idx="2" type="sldImg"/>
@@ -2287,7 +2292,7 @@
       </p:sp>
       <p:sp>
         <p:nvSpPr>
-          <p:cNvPr id="155" name="Google Shape;155;g1224e3e2fde_0_72:notes"/>
+          <p:cNvPr id="153" name="Google Shape;153;g1224e3e2fde_0_59:notes"/>
           <p:cNvSpPr txBox="1"/>
           <p:nvPr>
             <p:ph idx="1" type="body"/>
@@ -2326,7 +2331,146 @@
       </p:sp>
       <p:sp>
         <p:nvSpPr>
-          <p:cNvPr id="156" name="Google Shape;156;g1224e3e2fde_0_72:notes"/>
+          <p:cNvPr id="154" name="Google Shape;154;g1224e3e2fde_0_59:notes"/>
+          <p:cNvSpPr txBox="1"/>
+          <p:nvPr>
+            <p:ph idx="12" type="sldNum"/>
+          </p:nvPr>
+        </p:nvSpPr>
+        <p:spPr>
+          <a:xfrm>
+            <a:off x="3884613" y="8685213"/>
+            <a:ext cx="2971800" cy="458700"/>
+          </a:xfrm>
+          <a:prstGeom prst="rect">
+            <a:avLst/>
+          </a:prstGeom>
+        </p:spPr>
+        <p:txBody>
+          <a:bodyPr anchorCtr="0" anchor="b" bIns="45700" lIns="91425" spcFirstLastPara="1" rIns="91425" wrap="square" tIns="45700">
+            <a:noAutofit/>
+          </a:bodyPr>
+          <a:lstStyle/>
+          <a:p>
+            <a:pPr indent="0" lvl="0" marL="0" rtl="0" algn="r">
+              <a:spcBef>
+                <a:spcPts val="0"/>
+              </a:spcBef>
+              <a:spcAft>
+                <a:spcPts val="0"/>
+              </a:spcAft>
+              <a:buNone/>
+            </a:pPr>
+            <a:fld id="{00000000-1234-1234-1234-123412341234}" type="slidenum">
+              <a:rPr lang="pt-BR"/>
+              <a:t>‹#›</a:t>
+            </a:fld>
+            <a:endParaRPr/>
+          </a:p>
+        </p:txBody>
+      </p:sp>
+    </p:spTree>
+  </p:cSld>
+  <p:clrMapOvr>
+    <a:masterClrMapping/>
+  </p:clrMapOvr>
+</p:notes>
+</file>
+
+<file path=ppt/notesSlides/notesSlide8.xml><?xml version="1.0" encoding="utf-8"?>
+<p:notes xmlns:a="http://schemas.openxmlformats.org/drawingml/2006/main" xmlns:r="http://schemas.openxmlformats.org/officeDocument/2006/relationships" xmlns:mc="http://schemas.openxmlformats.org/markup-compatibility/2006" xmlns:mv="urn:schemas-microsoft-com:mac:vml" xmlns:p="http://schemas.openxmlformats.org/presentationml/2006/main" xmlns:c="http://schemas.openxmlformats.org/drawingml/2006/chart" xmlns:dgm="http://schemas.openxmlformats.org/drawingml/2006/diagram" xmlns:o="urn:schemas-microsoft-com:office:office" xmlns:v="urn:schemas-microsoft-com:vml" xmlns:pvml="urn:schemas-microsoft-com:office:powerpoint" xmlns:com="http://schemas.openxmlformats.org/drawingml/2006/compatibility" xmlns:p14="http://schemas.microsoft.com/office/powerpoint/2010/main" xmlns:p15="http://schemas.microsoft.com/office/powerpoint/2012/main" xmlns:ahyp="http://schemas.microsoft.com/office/drawing/2018/hyperlinkcolor" showMasterPhAnim="0" showMasterSp="0">
+  <p:cSld>
+    <p:spTree>
+      <p:nvGrpSpPr>
+        <p:cNvPr id="161" name="Shape 161"/>
+        <p:cNvGrpSpPr/>
+        <p:nvPr/>
+      </p:nvGrpSpPr>
+      <p:grpSpPr>
+        <a:xfrm>
+          <a:off x="0" y="0"/>
+          <a:ext cx="0" cy="0"/>
+          <a:chOff x="0" y="0"/>
+          <a:chExt cx="0" cy="0"/>
+        </a:xfrm>
+      </p:grpSpPr>
+      <p:sp>
+        <p:nvSpPr>
+          <p:cNvPr id="162" name="Google Shape;162;g1224e3e2fde_0_72:notes"/>
+          <p:cNvSpPr/>
+          <p:nvPr>
+            <p:ph idx="2" type="sldImg"/>
+          </p:nvPr>
+        </p:nvSpPr>
+        <p:spPr>
+          <a:xfrm>
+            <a:off x="685800" y="1143000"/>
+            <a:ext cx="5486400" cy="3086100"/>
+          </a:xfrm>
+          <a:custGeom>
+            <a:rect b="b" l="l" r="r" t="t"/>
+            <a:pathLst>
+              <a:path extrusionOk="0" h="120000" w="120000">
+                <a:moveTo>
+                  <a:pt x="0" y="0"/>
+                </a:moveTo>
+                <a:lnTo>
+                  <a:pt x="120000" y="0"/>
+                </a:lnTo>
+                <a:lnTo>
+                  <a:pt x="120000" y="120000"/>
+                </a:lnTo>
+                <a:lnTo>
+                  <a:pt x="0" y="120000"/>
+                </a:lnTo>
+                <a:close/>
+              </a:path>
+            </a:pathLst>
+          </a:custGeom>
+        </p:spPr>
+      </p:sp>
+      <p:sp>
+        <p:nvSpPr>
+          <p:cNvPr id="163" name="Google Shape;163;g1224e3e2fde_0_72:notes"/>
+          <p:cNvSpPr txBox="1"/>
+          <p:nvPr>
+            <p:ph idx="1" type="body"/>
+          </p:nvPr>
+        </p:nvSpPr>
+        <p:spPr>
+          <a:xfrm>
+            <a:off x="685800" y="4400550"/>
+            <a:ext cx="5486400" cy="3600600"/>
+          </a:xfrm>
+          <a:prstGeom prst="rect">
+            <a:avLst/>
+          </a:prstGeom>
+        </p:spPr>
+        <p:txBody>
+          <a:bodyPr anchorCtr="0" anchor="t" bIns="45700" lIns="91425" spcFirstLastPara="1" rIns="91425" wrap="square" tIns="45700">
+            <a:noAutofit/>
+          </a:bodyPr>
+          <a:lstStyle/>
+          <a:p>
+            <a:pPr indent="0" lvl="0" marL="0" rtl="0" algn="l">
+              <a:spcBef>
+                <a:spcPts val="0"/>
+              </a:spcBef>
+              <a:spcAft>
+                <a:spcPts val="0"/>
+              </a:spcAft>
+              <a:buNone/>
+            </a:pPr>
+            <a:r>
+              <a:t/>
+            </a:r>
+            <a:endParaRPr/>
+          </a:p>
+        </p:txBody>
+      </p:sp>
+      <p:sp>
+        <p:nvSpPr>
+          <p:cNvPr id="164" name="Google Shape;164;g1224e3e2fde_0_72:notes"/>
           <p:cNvSpPr txBox="1"/>
           <p:nvPr>
             <p:ph idx="12" type="sldNum"/>
@@ -13196,7 +13340,7 @@
             </a:pPr>
             <a:r>
               <a:rPr lang="pt-BR"/>
-              <a:t>Ambiente de execução</a:t>
+              <a:t>Objetivo</a:t>
             </a:r>
             <a:endParaRPr/>
           </a:p>
@@ -13254,6 +13398,188 @@
         </p:nvSpPr>
         <p:spPr>
           <a:xfrm>
+            <a:off x="1107900" y="2320800"/>
+            <a:ext cx="9976200" cy="2216400"/>
+          </a:xfrm>
+          <a:prstGeom prst="rect">
+            <a:avLst/>
+          </a:prstGeom>
+          <a:noFill/>
+          <a:ln>
+            <a:noFill/>
+          </a:ln>
+        </p:spPr>
+        <p:txBody>
+          <a:bodyPr anchorCtr="0" anchor="t" bIns="91425" lIns="91425" spcFirstLastPara="1" rIns="91425" wrap="square" tIns="91425">
+            <a:spAutoFit/>
+          </a:bodyPr>
+          <a:lstStyle/>
+          <a:p>
+            <a:pPr indent="0" lvl="0" marL="457200" rtl="0" algn="just">
+              <a:spcBef>
+                <a:spcPts val="0"/>
+              </a:spcBef>
+              <a:spcAft>
+                <a:spcPts val="0"/>
+              </a:spcAft>
+              <a:buNone/>
+            </a:pPr>
+            <a:r>
+              <a:rPr lang="pt-BR" sz="2200">
+                <a:latin typeface="Fira Sans"/>
+                <a:ea typeface="Fira Sans"/>
+                <a:cs typeface="Fira Sans"/>
+                <a:sym typeface="Fira Sans"/>
+              </a:rPr>
+              <a:t>Utilizar rotinas </a:t>
+            </a:r>
+            <a:r>
+              <a:rPr lang="pt-BR" sz="2200">
+                <a:solidFill>
+                  <a:schemeClr val="dk1"/>
+                </a:solidFill>
+                <a:latin typeface="Fira Sans"/>
+                <a:ea typeface="Fira Sans"/>
+                <a:cs typeface="Fira Sans"/>
+                <a:sym typeface="Fira Sans"/>
+              </a:rPr>
+              <a:t>de precisão dupla</a:t>
+            </a:r>
+            <a:r>
+              <a:rPr lang="pt-BR" sz="2200">
+                <a:latin typeface="Fira Sans"/>
+                <a:ea typeface="Fira Sans"/>
+                <a:cs typeface="Fira Sans"/>
+                <a:sym typeface="Fira Sans"/>
+              </a:rPr>
+              <a:t> do LAPACK para resolver sistemas lineares de uma matriz tridiagonal simétrica variando a sua dimensão, considerando o sistema  como: denso, denso simétrico, banda, banda simétrico, tridiagonal e tridiagonal simétrico. Realizar comparações e enfatizar que a escolha do melhor algoritmo de solução do sistema depende das características da matriz de entrada para o problema.</a:t>
+            </a:r>
+            <a:endParaRPr sz="2200">
+              <a:latin typeface="Fira Sans"/>
+              <a:ea typeface="Fira Sans"/>
+              <a:cs typeface="Fira Sans"/>
+              <a:sym typeface="Fira Sans"/>
+            </a:endParaRPr>
+          </a:p>
+        </p:txBody>
+      </p:sp>
+    </p:spTree>
+  </p:cSld>
+  <p:clrMapOvr>
+    <a:masterClrMapping/>
+  </p:clrMapOvr>
+</p:sld>
+</file>
+
+<file path=ppt/slides/slide3.xml><?xml version="1.0" encoding="utf-8"?>
+<p:sld xmlns:a="http://schemas.openxmlformats.org/drawingml/2006/main" xmlns:r="http://schemas.openxmlformats.org/officeDocument/2006/relationships" xmlns:mc="http://schemas.openxmlformats.org/markup-compatibility/2006" xmlns:mv="urn:schemas-microsoft-com:mac:vml" xmlns:p="http://schemas.openxmlformats.org/presentationml/2006/main" xmlns:c="http://schemas.openxmlformats.org/drawingml/2006/chart" xmlns:dgm="http://schemas.openxmlformats.org/drawingml/2006/diagram" xmlns:o="urn:schemas-microsoft-com:office:office" xmlns:v="urn:schemas-microsoft-com:vml" xmlns:pvml="urn:schemas-microsoft-com:office:powerpoint" xmlns:com="http://schemas.openxmlformats.org/drawingml/2006/compatibility" xmlns:p14="http://schemas.microsoft.com/office/powerpoint/2010/main" xmlns:p15="http://schemas.microsoft.com/office/powerpoint/2012/main" xmlns:ahyp="http://schemas.microsoft.com/office/drawing/2018/hyperlinkcolor">
+  <p:cSld>
+    <p:spTree>
+      <p:nvGrpSpPr>
+        <p:cNvPr id="113" name="Shape 113"/>
+        <p:cNvGrpSpPr/>
+        <p:nvPr/>
+      </p:nvGrpSpPr>
+      <p:grpSpPr>
+        <a:xfrm>
+          <a:off x="0" y="0"/>
+          <a:ext cx="0" cy="0"/>
+          <a:chOff x="0" y="0"/>
+          <a:chExt cx="0" cy="0"/>
+        </a:xfrm>
+      </p:grpSpPr>
+      <p:sp>
+        <p:nvSpPr>
+          <p:cNvPr id="114" name="Google Shape;114;p19"/>
+          <p:cNvSpPr txBox="1"/>
+          <p:nvPr>
+            <p:ph type="title"/>
+          </p:nvPr>
+        </p:nvSpPr>
+        <p:spPr>
+          <a:xfrm>
+            <a:off x="1155469" y="66183"/>
+            <a:ext cx="10914600" cy="1334400"/>
+          </a:xfrm>
+          <a:prstGeom prst="rect">
+            <a:avLst/>
+          </a:prstGeom>
+        </p:spPr>
+        <p:txBody>
+          <a:bodyPr anchorCtr="0" anchor="ctr" bIns="45700" lIns="91425" spcFirstLastPara="1" rIns="91425" wrap="square" tIns="45700">
+            <a:normAutofit/>
+          </a:bodyPr>
+          <a:lstStyle/>
+          <a:p>
+            <a:pPr indent="0" lvl="0" marL="0" rtl="0" algn="l">
+              <a:spcBef>
+                <a:spcPts val="0"/>
+              </a:spcBef>
+              <a:spcAft>
+                <a:spcPts val="0"/>
+              </a:spcAft>
+              <a:buNone/>
+            </a:pPr>
+            <a:r>
+              <a:rPr lang="pt-BR"/>
+              <a:t>Ambiente de execução</a:t>
+            </a:r>
+            <a:endParaRPr/>
+          </a:p>
+        </p:txBody>
+      </p:sp>
+      <p:sp>
+        <p:nvSpPr>
+          <p:cNvPr id="115" name="Google Shape;115;p19"/>
+          <p:cNvSpPr txBox="1"/>
+          <p:nvPr>
+            <p:ph idx="12" type="sldNum"/>
+          </p:nvPr>
+        </p:nvSpPr>
+        <p:spPr>
+          <a:xfrm>
+            <a:off x="8801100" y="6350138"/>
+            <a:ext cx="2743200" cy="365100"/>
+          </a:xfrm>
+          <a:prstGeom prst="rect">
+            <a:avLst/>
+          </a:prstGeom>
+        </p:spPr>
+        <p:txBody>
+          <a:bodyPr anchorCtr="0" anchor="ctr" bIns="45700" lIns="91425" spcFirstLastPara="1" rIns="91425" wrap="square" tIns="45700">
+            <a:noAutofit/>
+          </a:bodyPr>
+          <a:lstStyle/>
+          <a:p>
+            <a:pPr indent="0" lvl="0" marL="0" rtl="0" algn="r">
+              <a:spcBef>
+                <a:spcPts val="0"/>
+              </a:spcBef>
+              <a:spcAft>
+                <a:spcPts val="0"/>
+              </a:spcAft>
+              <a:buClr>
+                <a:srgbClr val="000000"/>
+              </a:buClr>
+              <a:buFont typeface="Arial"/>
+              <a:buNone/>
+            </a:pPr>
+            <a:fld id="{00000000-1234-1234-1234-123412341234}" type="slidenum">
+              <a:rPr lang="pt-BR"/>
+              <a:t>‹#›</a:t>
+            </a:fld>
+            <a:endParaRPr sz="3200"/>
+          </a:p>
+        </p:txBody>
+      </p:sp>
+      <p:sp>
+        <p:nvSpPr>
+          <p:cNvPr id="116" name="Google Shape;116;p19"/>
+          <p:cNvSpPr txBox="1"/>
+          <p:nvPr/>
+        </p:nvSpPr>
+        <p:spPr>
+          <a:xfrm>
             <a:off x="255000" y="1678525"/>
             <a:ext cx="6216900" cy="4032900"/>
           </a:xfrm>
@@ -13520,7 +13846,7 @@
       </p:sp>
       <p:sp>
         <p:nvSpPr>
-          <p:cNvPr id="109" name="Google Shape;109;p18"/>
+          <p:cNvPr id="117" name="Google Shape;117;p19"/>
           <p:cNvSpPr txBox="1"/>
           <p:nvPr/>
         </p:nvSpPr>
@@ -13741,7 +14067,7 @@
       </p:sp>
       <p:pic>
         <p:nvPicPr>
-          <p:cNvPr id="110" name="Google Shape;110;p18"/>
+          <p:cNvPr id="118" name="Google Shape;118;p19"/>
           <p:cNvPicPr preferRelativeResize="0"/>
           <p:nvPr/>
         </p:nvPicPr>
@@ -13769,7 +14095,7 @@
       </p:pic>
       <p:pic>
         <p:nvPicPr>
-          <p:cNvPr id="111" name="Google Shape;111;p18"/>
+          <p:cNvPr id="119" name="Google Shape;119;p19"/>
           <p:cNvPicPr preferRelativeResize="0"/>
           <p:nvPr/>
         </p:nvPicPr>
@@ -13834,7 +14160,7 @@
                                           </p:stCondLst>
                                         </p:cTn>
                                         <p:tgtEl>
-                                          <p:spTgt spid="108"/>
+                                          <p:spTgt spid="116"/>
                                         </p:tgtEl>
                                         <p:attrNameLst>
                                           <p:attrName>style.visibility</p:attrName>
@@ -13848,7 +14174,7 @@
                                       <p:cBhvr>
                                         <p:cTn dur="1000"/>
                                         <p:tgtEl>
-                                          <p:spTgt spid="108"/>
+                                          <p:spTgt spid="116"/>
                                         </p:tgtEl>
                                       </p:cBhvr>
                                     </p:animEffect>
@@ -13887,7 +14213,7 @@
                                           </p:stCondLst>
                                         </p:cTn>
                                         <p:tgtEl>
-                                          <p:spTgt spid="109"/>
+                                          <p:spTgt spid="117"/>
                                         </p:tgtEl>
                                         <p:attrNameLst>
                                           <p:attrName>style.visibility</p:attrName>
@@ -13901,7 +14227,7 @@
                                       <p:cBhvr>
                                         <p:cTn dur="1000"/>
                                         <p:tgtEl>
-                                          <p:spTgt spid="109"/>
+                                          <p:spTgt spid="117"/>
                                         </p:tgtEl>
                                       </p:cBhvr>
                                     </p:animEffect>
@@ -13922,7 +14248,7 @@
                                           </p:stCondLst>
                                         </p:cTn>
                                         <p:tgtEl>
-                                          <p:spTgt spid="110"/>
+                                          <p:spTgt spid="118"/>
                                         </p:tgtEl>
                                         <p:attrNameLst>
                                           <p:attrName>style.visibility</p:attrName>
@@ -13936,7 +14262,7 @@
                                       <p:cBhvr>
                                         <p:cTn dur="1000"/>
                                         <p:tgtEl>
-                                          <p:spTgt spid="110"/>
+                                          <p:spTgt spid="118"/>
                                         </p:tgtEl>
                                       </p:cBhvr>
                                     </p:animEffect>
@@ -13957,7 +14283,7 @@
                                           </p:stCondLst>
                                         </p:cTn>
                                         <p:tgtEl>
-                                          <p:spTgt spid="111"/>
+                                          <p:spTgt spid="119"/>
                                         </p:tgtEl>
                                         <p:attrNameLst>
                                           <p:attrName>style.visibility</p:attrName>
@@ -13971,7 +14297,7 @@
                                       <p:cBhvr>
                                         <p:cTn dur="1000"/>
                                         <p:tgtEl>
-                                          <p:spTgt spid="111"/>
+                                          <p:spTgt spid="119"/>
                                         </p:tgtEl>
                                       </p:cBhvr>
                                     </p:animEffect>
@@ -14009,12 +14335,12 @@
 </p:sld>
 </file>
 
-<file path=ppt/slides/slide3.xml><?xml version="1.0" encoding="utf-8"?>
+<file path=ppt/slides/slide4.xml><?xml version="1.0" encoding="utf-8"?>
 <p:sld xmlns:a="http://schemas.openxmlformats.org/drawingml/2006/main" xmlns:r="http://schemas.openxmlformats.org/officeDocument/2006/relationships" xmlns:mc="http://schemas.openxmlformats.org/markup-compatibility/2006" xmlns:mv="urn:schemas-microsoft-com:mac:vml" xmlns:p="http://schemas.openxmlformats.org/presentationml/2006/main" xmlns:c="http://schemas.openxmlformats.org/drawingml/2006/chart" xmlns:dgm="http://schemas.openxmlformats.org/drawingml/2006/diagram" xmlns:o="urn:schemas-microsoft-com:office:office" xmlns:v="urn:schemas-microsoft-com:vml" xmlns:pvml="urn:schemas-microsoft-com:office:powerpoint" xmlns:com="http://schemas.openxmlformats.org/drawingml/2006/compatibility" xmlns:p14="http://schemas.microsoft.com/office/powerpoint/2010/main" xmlns:p15="http://schemas.microsoft.com/office/powerpoint/2012/main" xmlns:ahyp="http://schemas.microsoft.com/office/drawing/2018/hyperlinkcolor">
   <p:cSld>
     <p:spTree>
       <p:nvGrpSpPr>
-        <p:cNvPr id="116" name="Shape 116"/>
+        <p:cNvPr id="124" name="Shape 124"/>
         <p:cNvGrpSpPr/>
         <p:nvPr/>
       </p:nvGrpSpPr>
@@ -14028,7 +14354,7 @@
       </p:grpSpPr>
       <p:sp>
         <p:nvSpPr>
-          <p:cNvPr id="117" name="Google Shape;117;p19"/>
+          <p:cNvPr id="125" name="Google Shape;125;p20"/>
           <p:cNvSpPr txBox="1"/>
           <p:nvPr>
             <p:ph type="title"/>
@@ -14068,7 +14394,7 @@
       </p:sp>
       <p:sp>
         <p:nvSpPr>
-          <p:cNvPr id="118" name="Google Shape;118;p19"/>
+          <p:cNvPr id="126" name="Google Shape;126;p20"/>
           <p:cNvSpPr txBox="1"/>
           <p:nvPr>
             <p:ph idx="12" type="sldNum"/>
@@ -14112,7 +14438,7 @@
       </p:sp>
       <p:sp>
         <p:nvSpPr>
-          <p:cNvPr id="119" name="Google Shape;119;p19"/>
+          <p:cNvPr id="127" name="Google Shape;127;p20"/>
           <p:cNvSpPr txBox="1"/>
           <p:nvPr/>
         </p:nvSpPr>
@@ -14166,7 +14492,7 @@
       </p:sp>
       <p:pic>
         <p:nvPicPr>
-          <p:cNvPr id="120" name="Google Shape;120;p19"/>
+          <p:cNvPr id="128" name="Google Shape;128;p20"/>
           <p:cNvPicPr preferRelativeResize="0"/>
           <p:nvPr/>
         </p:nvPicPr>
@@ -14194,7 +14520,7 @@
       </p:pic>
       <p:pic>
         <p:nvPicPr>
-          <p:cNvPr id="121" name="Google Shape;121;p19"/>
+          <p:cNvPr id="129" name="Google Shape;129;p20"/>
           <p:cNvPicPr preferRelativeResize="0"/>
           <p:nvPr/>
         </p:nvPicPr>
@@ -14222,7 +14548,7 @@
       </p:pic>
       <p:cxnSp>
         <p:nvCxnSpPr>
-          <p:cNvPr id="122" name="Google Shape;122;p19"/>
+          <p:cNvPr id="130" name="Google Shape;130;p20"/>
           <p:cNvCxnSpPr/>
           <p:nvPr/>
         </p:nvCxnSpPr>
@@ -14285,7 +14611,7 @@
                                           </p:stCondLst>
                                         </p:cTn>
                                         <p:tgtEl>
-                                          <p:spTgt spid="121"/>
+                                          <p:spTgt spid="129"/>
                                         </p:tgtEl>
                                         <p:attrNameLst>
                                           <p:attrName>style.visibility</p:attrName>
@@ -14299,7 +14625,7 @@
                                       <p:cBhvr>
                                         <p:cTn dur="1000"/>
                                         <p:tgtEl>
-                                          <p:spTgt spid="121"/>
+                                          <p:spTgt spid="129"/>
                                         </p:tgtEl>
                                       </p:cBhvr>
                                     </p:animEffect>
@@ -14312,623 +14638,6 @@
                       </p:childTnLst>
                     </p:cTn>
                   </p:par>
-                  <p:par>
-                    <p:cTn fill="hold">
-                      <p:stCondLst>
-                        <p:cond delay="indefinite"/>
-                      </p:stCondLst>
-                      <p:childTnLst>
-                        <p:par>
-                          <p:cTn fill="hold">
-                            <p:stCondLst>
-                              <p:cond delay="0"/>
-                            </p:stCondLst>
-                            <p:childTnLst>
-                              <p:par>
-                                <p:cTn fill="hold" nodeType="clickEffect" presetClass="entr" presetID="10" presetSubtype="0">
-                                  <p:stCondLst>
-                                    <p:cond delay="0"/>
-                                  </p:stCondLst>
-                                  <p:childTnLst>
-                                    <p:set>
-                                      <p:cBhvr>
-                                        <p:cTn dur="1" fill="hold">
-                                          <p:stCondLst>
-                                            <p:cond delay="0"/>
-                                          </p:stCondLst>
-                                        </p:cTn>
-                                        <p:tgtEl>
-                                          <p:spTgt spid="122"/>
-                                        </p:tgtEl>
-                                        <p:attrNameLst>
-                                          <p:attrName>style.visibility</p:attrName>
-                                        </p:attrNameLst>
-                                      </p:cBhvr>
-                                      <p:to>
-                                        <p:strVal val="visible"/>
-                                      </p:to>
-                                    </p:set>
-                                    <p:animEffect filter="fade" transition="in">
-                                      <p:cBhvr>
-                                        <p:cTn dur="1000"/>
-                                        <p:tgtEl>
-                                          <p:spTgt spid="122"/>
-                                        </p:tgtEl>
-                                      </p:cBhvr>
-                                    </p:animEffect>
-                                  </p:childTnLst>
-                                </p:cTn>
-                              </p:par>
-                            </p:childTnLst>
-                          </p:cTn>
-                        </p:par>
-                      </p:childTnLst>
-                    </p:cTn>
-                  </p:par>
-                  <p:par>
-                    <p:cTn fill="hold">
-                      <p:stCondLst>
-                        <p:cond delay="indefinite"/>
-                      </p:stCondLst>
-                      <p:childTnLst>
-                        <p:par>
-                          <p:cTn fill="hold">
-                            <p:stCondLst>
-                              <p:cond delay="0"/>
-                            </p:stCondLst>
-                            <p:childTnLst>
-                              <p:par>
-                                <p:cTn fill="hold" nodeType="clickEffect" presetClass="entr" presetID="10" presetSubtype="0">
-                                  <p:stCondLst>
-                                    <p:cond delay="0"/>
-                                  </p:stCondLst>
-                                  <p:childTnLst>
-                                    <p:set>
-                                      <p:cBhvr>
-                                        <p:cTn dur="1" fill="hold">
-                                          <p:stCondLst>
-                                            <p:cond delay="0"/>
-                                          </p:stCondLst>
-                                        </p:cTn>
-                                        <p:tgtEl>
-                                          <p:spTgt spid="120"/>
-                                        </p:tgtEl>
-                                        <p:attrNameLst>
-                                          <p:attrName>style.visibility</p:attrName>
-                                        </p:attrNameLst>
-                                      </p:cBhvr>
-                                      <p:to>
-                                        <p:strVal val="visible"/>
-                                      </p:to>
-                                    </p:set>
-                                    <p:animEffect filter="fade" transition="in">
-                                      <p:cBhvr>
-                                        <p:cTn dur="1000"/>
-                                        <p:tgtEl>
-                                          <p:spTgt spid="120"/>
-                                        </p:tgtEl>
-                                      </p:cBhvr>
-                                    </p:animEffect>
-                                  </p:childTnLst>
-                                </p:cTn>
-                              </p:par>
-                            </p:childTnLst>
-                          </p:cTn>
-                        </p:par>
-                      </p:childTnLst>
-                    </p:cTn>
-                  </p:par>
-                </p:childTnLst>
-              </p:cTn>
-              <p:prevCondLst>
-                <p:cond evt="onPrev">
-                  <p:tgtEl>
-                    <p:sldTgt/>
-                  </p:tgtEl>
-                </p:cond>
-              </p:prevCondLst>
-              <p:nextCondLst>
-                <p:cond evt="onNext">
-                  <p:tgtEl>
-                    <p:sldTgt/>
-                  </p:tgtEl>
-                </p:cond>
-              </p:nextCondLst>
-            </p:seq>
-          </p:childTnLst>
-        </p:cTn>
-      </p:par>
-    </p:tnLst>
-  </p:timing>
-</p:sld>
-</file>
-
-<file path=ppt/slides/slide4.xml><?xml version="1.0" encoding="utf-8"?>
-<p:sld xmlns:a="http://schemas.openxmlformats.org/drawingml/2006/main" xmlns:r="http://schemas.openxmlformats.org/officeDocument/2006/relationships" xmlns:mc="http://schemas.openxmlformats.org/markup-compatibility/2006" xmlns:mv="urn:schemas-microsoft-com:mac:vml" xmlns:p="http://schemas.openxmlformats.org/presentationml/2006/main" xmlns:c="http://schemas.openxmlformats.org/drawingml/2006/chart" xmlns:dgm="http://schemas.openxmlformats.org/drawingml/2006/diagram" xmlns:o="urn:schemas-microsoft-com:office:office" xmlns:v="urn:schemas-microsoft-com:vml" xmlns:pvml="urn:schemas-microsoft-com:office:powerpoint" xmlns:com="http://schemas.openxmlformats.org/drawingml/2006/compatibility" xmlns:p14="http://schemas.microsoft.com/office/powerpoint/2010/main" xmlns:p15="http://schemas.microsoft.com/office/powerpoint/2012/main" xmlns:ahyp="http://schemas.microsoft.com/office/drawing/2018/hyperlinkcolor">
-  <p:cSld>
-    <p:spTree>
-      <p:nvGrpSpPr>
-        <p:cNvPr id="127" name="Shape 127"/>
-        <p:cNvGrpSpPr/>
-        <p:nvPr/>
-      </p:nvGrpSpPr>
-      <p:grpSpPr>
-        <a:xfrm>
-          <a:off x="0" y="0"/>
-          <a:ext cx="0" cy="0"/>
-          <a:chOff x="0" y="0"/>
-          <a:chExt cx="0" cy="0"/>
-        </a:xfrm>
-      </p:grpSpPr>
-      <p:sp>
-        <p:nvSpPr>
-          <p:cNvPr id="128" name="Google Shape;128;p20"/>
-          <p:cNvSpPr txBox="1"/>
-          <p:nvPr>
-            <p:ph type="title"/>
-          </p:nvPr>
-        </p:nvSpPr>
-        <p:spPr>
-          <a:xfrm>
-            <a:off x="1155469" y="66183"/>
-            <a:ext cx="10914600" cy="1334400"/>
-          </a:xfrm>
-          <a:prstGeom prst="rect">
-            <a:avLst/>
-          </a:prstGeom>
-        </p:spPr>
-        <p:txBody>
-          <a:bodyPr anchorCtr="0" anchor="ctr" bIns="45700" lIns="91425" spcFirstLastPara="1" rIns="91425" wrap="square" tIns="45700">
-            <a:normAutofit/>
-          </a:bodyPr>
-          <a:lstStyle/>
-          <a:p>
-            <a:pPr indent="0" lvl="0" marL="0" rtl="0" algn="l">
-              <a:spcBef>
-                <a:spcPts val="0"/>
-              </a:spcBef>
-              <a:spcAft>
-                <a:spcPts val="0"/>
-              </a:spcAft>
-              <a:buNone/>
-            </a:pPr>
-            <a:r>
-              <a:rPr lang="pt-BR"/>
-              <a:t>Caso Denso</a:t>
-            </a:r>
-            <a:endParaRPr/>
-          </a:p>
-        </p:txBody>
-      </p:sp>
-      <p:sp>
-        <p:nvSpPr>
-          <p:cNvPr id="129" name="Google Shape;129;p20"/>
-          <p:cNvSpPr txBox="1"/>
-          <p:nvPr>
-            <p:ph idx="12" type="sldNum"/>
-          </p:nvPr>
-        </p:nvSpPr>
-        <p:spPr>
-          <a:xfrm>
-            <a:off x="8801100" y="6350138"/>
-            <a:ext cx="2743200" cy="365100"/>
-          </a:xfrm>
-          <a:prstGeom prst="rect">
-            <a:avLst/>
-          </a:prstGeom>
-        </p:spPr>
-        <p:txBody>
-          <a:bodyPr anchorCtr="0" anchor="ctr" bIns="45700" lIns="91425" spcFirstLastPara="1" rIns="91425" wrap="square" tIns="45700">
-            <a:noAutofit/>
-          </a:bodyPr>
-          <a:lstStyle/>
-          <a:p>
-            <a:pPr indent="0" lvl="0" marL="0" rtl="0" algn="r">
-              <a:spcBef>
-                <a:spcPts val="0"/>
-              </a:spcBef>
-              <a:spcAft>
-                <a:spcPts val="0"/>
-              </a:spcAft>
-              <a:buClr>
-                <a:srgbClr val="000000"/>
-              </a:buClr>
-              <a:buFont typeface="Arial"/>
-              <a:buNone/>
-            </a:pPr>
-            <a:fld id="{00000000-1234-1234-1234-123412341234}" type="slidenum">
-              <a:rPr lang="pt-BR"/>
-              <a:t>‹#›</a:t>
-            </a:fld>
-            <a:endParaRPr sz="3200"/>
-          </a:p>
-        </p:txBody>
-      </p:sp>
-      <p:sp>
-        <p:nvSpPr>
-          <p:cNvPr id="130" name="Google Shape;130;p20"/>
-          <p:cNvSpPr txBox="1"/>
-          <p:nvPr/>
-        </p:nvSpPr>
-        <p:spPr>
-          <a:xfrm>
-            <a:off x="951638" y="1056750"/>
-            <a:ext cx="5426100" cy="1046700"/>
-          </a:xfrm>
-          <a:prstGeom prst="rect">
-            <a:avLst/>
-          </a:prstGeom>
-          <a:noFill/>
-          <a:ln>
-            <a:noFill/>
-          </a:ln>
-        </p:spPr>
-        <p:txBody>
-          <a:bodyPr anchorCtr="0" anchor="t" bIns="91425" lIns="91425" spcFirstLastPara="1" rIns="91425" wrap="square" tIns="91425">
-            <a:spAutoFit/>
-          </a:bodyPr>
-          <a:lstStyle/>
-          <a:p>
-            <a:pPr indent="0" lvl="0" marL="457200" rtl="0" algn="l">
-              <a:spcBef>
-                <a:spcPts val="0"/>
-              </a:spcBef>
-              <a:spcAft>
-                <a:spcPts val="0"/>
-              </a:spcAft>
-              <a:buNone/>
-            </a:pPr>
-            <a:r>
-              <a:rPr lang="pt-BR">
-                <a:latin typeface="Fira Sans"/>
-                <a:ea typeface="Fira Sans"/>
-                <a:cs typeface="Fira Sans"/>
-                <a:sym typeface="Fira Sans"/>
-              </a:rPr>
-              <a:t>Assimétrico:</a:t>
-            </a:r>
-            <a:endParaRPr>
-              <a:latin typeface="Fira Sans"/>
-              <a:ea typeface="Fira Sans"/>
-              <a:cs typeface="Fira Sans"/>
-              <a:sym typeface="Fira Sans"/>
-            </a:endParaRPr>
-          </a:p>
-          <a:p>
-            <a:pPr indent="-317500" lvl="0" marL="914400" rtl="0" algn="l">
-              <a:spcBef>
-                <a:spcPts val="0"/>
-              </a:spcBef>
-              <a:spcAft>
-                <a:spcPts val="0"/>
-              </a:spcAft>
-              <a:buClr>
-                <a:schemeClr val="dk1"/>
-              </a:buClr>
-              <a:buSzPts val="1400"/>
-              <a:buFont typeface="Fira Sans"/>
-              <a:buChar char="●"/>
-            </a:pPr>
-            <a:r>
-              <a:rPr lang="pt-BR">
-                <a:solidFill>
-                  <a:schemeClr val="dk1"/>
-                </a:solidFill>
-                <a:latin typeface="Fira Sans"/>
-                <a:ea typeface="Fira Sans"/>
-                <a:cs typeface="Fira Sans"/>
-                <a:sym typeface="Fira Sans"/>
-              </a:rPr>
-              <a:t>Função: </a:t>
-            </a:r>
-            <a:r>
-              <a:rPr lang="pt-BR">
-                <a:solidFill>
-                  <a:schemeClr val="dk1"/>
-                </a:solidFill>
-                <a:latin typeface="Fira Sans"/>
-                <a:ea typeface="Fira Sans"/>
-                <a:cs typeface="Fira Sans"/>
-                <a:sym typeface="Fira Sans"/>
-              </a:rPr>
-              <a:t>dgesv </a:t>
-            </a:r>
-            <a:endParaRPr>
-              <a:solidFill>
-                <a:schemeClr val="dk1"/>
-              </a:solidFill>
-              <a:latin typeface="Fira Sans"/>
-              <a:ea typeface="Fira Sans"/>
-              <a:cs typeface="Fira Sans"/>
-              <a:sym typeface="Fira Sans"/>
-            </a:endParaRPr>
-          </a:p>
-          <a:p>
-            <a:pPr indent="-317500" lvl="0" marL="914400" rtl="0" algn="l">
-              <a:spcBef>
-                <a:spcPts val="0"/>
-              </a:spcBef>
-              <a:spcAft>
-                <a:spcPts val="0"/>
-              </a:spcAft>
-              <a:buClr>
-                <a:schemeClr val="dk1"/>
-              </a:buClr>
-              <a:buSzPts val="1400"/>
-              <a:buFont typeface="Fira Sans"/>
-              <a:buChar char="●"/>
-            </a:pPr>
-            <a:r>
-              <a:rPr lang="pt-BR">
-                <a:solidFill>
-                  <a:schemeClr val="dk1"/>
-                </a:solidFill>
-                <a:latin typeface="Fira Sans"/>
-                <a:ea typeface="Fira Sans"/>
-                <a:cs typeface="Fira Sans"/>
-                <a:sym typeface="Fira Sans"/>
-              </a:rPr>
-              <a:t>Requerimento: Matriz qualquer</a:t>
-            </a:r>
-            <a:endParaRPr>
-              <a:solidFill>
-                <a:schemeClr val="dk1"/>
-              </a:solidFill>
-              <a:latin typeface="Fira Sans"/>
-              <a:ea typeface="Fira Sans"/>
-              <a:cs typeface="Fira Sans"/>
-              <a:sym typeface="Fira Sans"/>
-            </a:endParaRPr>
-          </a:p>
-          <a:p>
-            <a:pPr indent="-317500" lvl="0" marL="914400" rtl="0" algn="l">
-              <a:spcBef>
-                <a:spcPts val="0"/>
-              </a:spcBef>
-              <a:spcAft>
-                <a:spcPts val="0"/>
-              </a:spcAft>
-              <a:buClr>
-                <a:schemeClr val="dk1"/>
-              </a:buClr>
-              <a:buSzPts val="1400"/>
-              <a:buFont typeface="Fira Sans"/>
-              <a:buChar char="●"/>
-            </a:pPr>
-            <a:r>
-              <a:rPr lang="pt-BR">
-                <a:solidFill>
-                  <a:schemeClr val="dk1"/>
-                </a:solidFill>
-                <a:latin typeface="Fira Sans"/>
-                <a:ea typeface="Fira Sans"/>
-                <a:cs typeface="Fira Sans"/>
-                <a:sym typeface="Fira Sans"/>
-              </a:rPr>
-              <a:t>Entrada: A de dimensão (n,n)</a:t>
-            </a:r>
-            <a:endParaRPr>
-              <a:solidFill>
-                <a:schemeClr val="dk1"/>
-              </a:solidFill>
-              <a:latin typeface="Fira Sans"/>
-              <a:ea typeface="Fira Sans"/>
-              <a:cs typeface="Fira Sans"/>
-              <a:sym typeface="Fira Sans"/>
-            </a:endParaRPr>
-          </a:p>
-        </p:txBody>
-      </p:sp>
-      <p:sp>
-        <p:nvSpPr>
-          <p:cNvPr id="131" name="Google Shape;131;p20"/>
-          <p:cNvSpPr txBox="1"/>
-          <p:nvPr/>
-        </p:nvSpPr>
-        <p:spPr>
-          <a:xfrm>
-            <a:off x="6726313" y="1056750"/>
-            <a:ext cx="5426100" cy="1046700"/>
-          </a:xfrm>
-          <a:prstGeom prst="rect">
-            <a:avLst/>
-          </a:prstGeom>
-          <a:noFill/>
-          <a:ln>
-            <a:noFill/>
-          </a:ln>
-        </p:spPr>
-        <p:txBody>
-          <a:bodyPr anchorCtr="0" anchor="t" bIns="91425" lIns="91425" spcFirstLastPara="1" rIns="91425" wrap="square" tIns="91425">
-            <a:spAutoFit/>
-          </a:bodyPr>
-          <a:lstStyle/>
-          <a:p>
-            <a:pPr indent="0" lvl="0" marL="457200" rtl="0" algn="l">
-              <a:spcBef>
-                <a:spcPts val="0"/>
-              </a:spcBef>
-              <a:spcAft>
-                <a:spcPts val="0"/>
-              </a:spcAft>
-              <a:buNone/>
-            </a:pPr>
-            <a:r>
-              <a:rPr lang="pt-BR">
-                <a:latin typeface="Fira Sans"/>
-                <a:ea typeface="Fira Sans"/>
-                <a:cs typeface="Fira Sans"/>
-                <a:sym typeface="Fira Sans"/>
-              </a:rPr>
-              <a:t>Simétrico</a:t>
-            </a:r>
-            <a:r>
-              <a:rPr lang="pt-BR">
-                <a:latin typeface="Fira Sans"/>
-                <a:ea typeface="Fira Sans"/>
-                <a:cs typeface="Fira Sans"/>
-                <a:sym typeface="Fira Sans"/>
-              </a:rPr>
-              <a:t>:</a:t>
-            </a:r>
-            <a:endParaRPr>
-              <a:latin typeface="Fira Sans"/>
-              <a:ea typeface="Fira Sans"/>
-              <a:cs typeface="Fira Sans"/>
-              <a:sym typeface="Fira Sans"/>
-            </a:endParaRPr>
-          </a:p>
-          <a:p>
-            <a:pPr indent="-317500" lvl="0" marL="914400" rtl="0" algn="l">
-              <a:spcBef>
-                <a:spcPts val="0"/>
-              </a:spcBef>
-              <a:spcAft>
-                <a:spcPts val="0"/>
-              </a:spcAft>
-              <a:buClr>
-                <a:schemeClr val="dk1"/>
-              </a:buClr>
-              <a:buSzPts val="1400"/>
-              <a:buFont typeface="Fira Sans"/>
-              <a:buChar char="●"/>
-            </a:pPr>
-            <a:r>
-              <a:rPr lang="pt-BR">
-                <a:solidFill>
-                  <a:schemeClr val="dk1"/>
-                </a:solidFill>
-                <a:latin typeface="Fira Sans"/>
-                <a:ea typeface="Fira Sans"/>
-                <a:cs typeface="Fira Sans"/>
-                <a:sym typeface="Fira Sans"/>
-              </a:rPr>
-              <a:t>Função: dposv</a:t>
-            </a:r>
-            <a:endParaRPr>
-              <a:solidFill>
-                <a:schemeClr val="dk1"/>
-              </a:solidFill>
-              <a:latin typeface="Fira Sans"/>
-              <a:ea typeface="Fira Sans"/>
-              <a:cs typeface="Fira Sans"/>
-              <a:sym typeface="Fira Sans"/>
-            </a:endParaRPr>
-          </a:p>
-          <a:p>
-            <a:pPr indent="-317500" lvl="0" marL="914400" rtl="0" algn="l">
-              <a:spcBef>
-                <a:spcPts val="0"/>
-              </a:spcBef>
-              <a:spcAft>
-                <a:spcPts val="0"/>
-              </a:spcAft>
-              <a:buClr>
-                <a:schemeClr val="dk1"/>
-              </a:buClr>
-              <a:buSzPts val="1400"/>
-              <a:buFont typeface="Fira Sans"/>
-              <a:buChar char="●"/>
-            </a:pPr>
-            <a:r>
-              <a:rPr lang="pt-BR">
-                <a:solidFill>
-                  <a:schemeClr val="dk1"/>
-                </a:solidFill>
-                <a:latin typeface="Fira Sans"/>
-                <a:ea typeface="Fira Sans"/>
-                <a:cs typeface="Fira Sans"/>
-                <a:sym typeface="Fira Sans"/>
-              </a:rPr>
-              <a:t>Requerimento: Matriz simétrica positiva definida</a:t>
-            </a:r>
-            <a:endParaRPr>
-              <a:solidFill>
-                <a:schemeClr val="dk1"/>
-              </a:solidFill>
-              <a:latin typeface="Fira Sans"/>
-              <a:ea typeface="Fira Sans"/>
-              <a:cs typeface="Fira Sans"/>
-              <a:sym typeface="Fira Sans"/>
-            </a:endParaRPr>
-          </a:p>
-          <a:p>
-            <a:pPr indent="-317500" lvl="0" marL="914400" rtl="0" algn="l">
-              <a:spcBef>
-                <a:spcPts val="0"/>
-              </a:spcBef>
-              <a:spcAft>
-                <a:spcPts val="0"/>
-              </a:spcAft>
-              <a:buClr>
-                <a:schemeClr val="dk1"/>
-              </a:buClr>
-              <a:buSzPts val="1400"/>
-              <a:buFont typeface="Fira Sans"/>
-              <a:buChar char="●"/>
-            </a:pPr>
-            <a:r>
-              <a:rPr lang="pt-BR">
-                <a:solidFill>
-                  <a:schemeClr val="dk1"/>
-                </a:solidFill>
-                <a:latin typeface="Fira Sans"/>
-                <a:ea typeface="Fira Sans"/>
-                <a:cs typeface="Fira Sans"/>
-                <a:sym typeface="Fira Sans"/>
-              </a:rPr>
-              <a:t>Entrada: Matriz A triangular *</a:t>
-            </a:r>
-            <a:endParaRPr>
-              <a:latin typeface="Fira Sans"/>
-              <a:ea typeface="Fira Sans"/>
-              <a:cs typeface="Fira Sans"/>
-              <a:sym typeface="Fira Sans"/>
-            </a:endParaRPr>
-          </a:p>
-        </p:txBody>
-      </p:sp>
-      <p:pic>
-        <p:nvPicPr>
-          <p:cNvPr id="132" name="Google Shape;132;p20"/>
-          <p:cNvPicPr preferRelativeResize="0"/>
-          <p:nvPr/>
-        </p:nvPicPr>
-        <p:blipFill>
-          <a:blip r:embed="rId3">
-            <a:alphaModFix/>
-          </a:blip>
-          <a:stretch>
-            <a:fillRect/>
-          </a:stretch>
-        </p:blipFill>
-        <p:spPr>
-          <a:xfrm>
-            <a:off x="832975" y="2103438"/>
-            <a:ext cx="10526060" cy="3941887"/>
-          </a:xfrm>
-          <a:prstGeom prst="rect">
-            <a:avLst/>
-          </a:prstGeom>
-          <a:noFill/>
-          <a:ln>
-            <a:noFill/>
-          </a:ln>
-        </p:spPr>
-      </p:pic>
-    </p:spTree>
-  </p:cSld>
-  <p:clrMapOvr>
-    <a:masterClrMapping/>
-  </p:clrMapOvr>
-  <p:timing>
-    <p:tnLst>
-      <p:par>
-        <p:cTn dur="indefinite" nodeType="tmRoot" restart="never">
-          <p:childTnLst>
-            <p:seq concurrent="1" nextAc="seek">
-              <p:cTn dur="indefinite" id="2" nodeType="mainSeq">
-                <p:childTnLst>
                   <p:par>
                     <p:cTn fill="hold">
                       <p:stCondLst>
@@ -15008,7 +14717,7 @@
                                           </p:stCondLst>
                                         </p:cTn>
                                         <p:tgtEl>
-                                          <p:spTgt spid="131"/>
+                                          <p:spTgt spid="128"/>
                                         </p:tgtEl>
                                         <p:attrNameLst>
                                           <p:attrName>style.visibility</p:attrName>
@@ -15022,60 +14731,7 @@
                                       <p:cBhvr>
                                         <p:cTn dur="1000"/>
                                         <p:tgtEl>
-                                          <p:spTgt spid="131"/>
-                                        </p:tgtEl>
-                                      </p:cBhvr>
-                                    </p:animEffect>
-                                  </p:childTnLst>
-                                </p:cTn>
-                              </p:par>
-                            </p:childTnLst>
-                          </p:cTn>
-                        </p:par>
-                      </p:childTnLst>
-                    </p:cTn>
-                  </p:par>
-                  <p:par>
-                    <p:cTn fill="hold">
-                      <p:stCondLst>
-                        <p:cond delay="indefinite"/>
-                      </p:stCondLst>
-                      <p:childTnLst>
-                        <p:par>
-                          <p:cTn fill="hold">
-                            <p:stCondLst>
-                              <p:cond delay="0"/>
-                            </p:stCondLst>
-                            <p:childTnLst>
-                              <p:par>
-                                <p:cTn fill="hold" nodeType="clickEffect" presetClass="entr" presetID="10" presetSubtype="0">
-                                  <p:stCondLst>
-                                    <p:cond delay="0"/>
-                                  </p:stCondLst>
-                                  <p:childTnLst>
-                                    <p:set>
-                                      <p:cBhvr>
-                                        <p:cTn dur="1" fill="hold">
-                                          <p:stCondLst>
-                                            <p:cond delay="0"/>
-                                          </p:stCondLst>
-                                        </p:cTn>
-                                        <p:tgtEl>
-                                          <p:spTgt spid="132"/>
-                                        </p:tgtEl>
-                                        <p:attrNameLst>
-                                          <p:attrName>style.visibility</p:attrName>
-                                        </p:attrNameLst>
-                                      </p:cBhvr>
-                                      <p:to>
-                                        <p:strVal val="visible"/>
-                                      </p:to>
-                                    </p:set>
-                                    <p:animEffect filter="fade" transition="in">
-                                      <p:cBhvr>
-                                        <p:cTn dur="1000"/>
-                                        <p:tgtEl>
-                                          <p:spTgt spid="132"/>
+                                          <p:spTgt spid="128"/>
                                         </p:tgtEl>
                                       </p:cBhvr>
                                     </p:animEffect>
@@ -15118,7 +14774,7 @@
   <p:cSld>
     <p:spTree>
       <p:nvGrpSpPr>
-        <p:cNvPr id="137" name="Shape 137"/>
+        <p:cNvPr id="135" name="Shape 135"/>
         <p:cNvGrpSpPr/>
         <p:nvPr/>
       </p:nvGrpSpPr>
@@ -15132,7 +14788,7 @@
       </p:grpSpPr>
       <p:sp>
         <p:nvSpPr>
-          <p:cNvPr id="138" name="Google Shape;138;p21"/>
+          <p:cNvPr id="136" name="Google Shape;136;p21"/>
           <p:cNvSpPr txBox="1"/>
           <p:nvPr>
             <p:ph type="title"/>
@@ -15164,7 +14820,7 @@
             </a:pPr>
             <a:r>
               <a:rPr lang="pt-BR"/>
-              <a:t>Caso Banda</a:t>
+              <a:t>Caso Denso</a:t>
             </a:r>
             <a:endParaRPr/>
           </a:p>
@@ -15172,7 +14828,7 @@
       </p:sp>
       <p:sp>
         <p:nvSpPr>
-          <p:cNvPr id="139" name="Google Shape;139;p21"/>
+          <p:cNvPr id="137" name="Google Shape;137;p21"/>
           <p:cNvSpPr txBox="1"/>
           <p:nvPr>
             <p:ph idx="12" type="sldNum"/>
@@ -15200,6 +14856,10 @@
               <a:spcAft>
                 <a:spcPts val="0"/>
               </a:spcAft>
+              <a:buClr>
+                <a:srgbClr val="000000"/>
+              </a:buClr>
+              <a:buFont typeface="Arial"/>
               <a:buNone/>
             </a:pPr>
             <a:fld id="{00000000-1234-1234-1234-123412341234}" type="slidenum">
@@ -15212,7 +14872,673 @@
       </p:sp>
       <p:sp>
         <p:nvSpPr>
+          <p:cNvPr id="138" name="Google Shape;138;p21"/>
+          <p:cNvSpPr txBox="1"/>
+          <p:nvPr/>
+        </p:nvSpPr>
+        <p:spPr>
+          <a:xfrm>
+            <a:off x="951638" y="1056750"/>
+            <a:ext cx="5426100" cy="1046700"/>
+          </a:xfrm>
+          <a:prstGeom prst="rect">
+            <a:avLst/>
+          </a:prstGeom>
+          <a:noFill/>
+          <a:ln>
+            <a:noFill/>
+          </a:ln>
+        </p:spPr>
+        <p:txBody>
+          <a:bodyPr anchorCtr="0" anchor="t" bIns="91425" lIns="91425" spcFirstLastPara="1" rIns="91425" wrap="square" tIns="91425">
+            <a:spAutoFit/>
+          </a:bodyPr>
+          <a:lstStyle/>
+          <a:p>
+            <a:pPr indent="0" lvl="0" marL="457200" rtl="0" algn="l">
+              <a:spcBef>
+                <a:spcPts val="0"/>
+              </a:spcBef>
+              <a:spcAft>
+                <a:spcPts val="0"/>
+              </a:spcAft>
+              <a:buNone/>
+            </a:pPr>
+            <a:r>
+              <a:rPr lang="pt-BR">
+                <a:latin typeface="Fira Sans"/>
+                <a:ea typeface="Fira Sans"/>
+                <a:cs typeface="Fira Sans"/>
+                <a:sym typeface="Fira Sans"/>
+              </a:rPr>
+              <a:t>Assimétrico:</a:t>
+            </a:r>
+            <a:endParaRPr>
+              <a:latin typeface="Fira Sans"/>
+              <a:ea typeface="Fira Sans"/>
+              <a:cs typeface="Fira Sans"/>
+              <a:sym typeface="Fira Sans"/>
+            </a:endParaRPr>
+          </a:p>
+          <a:p>
+            <a:pPr indent="-317500" lvl="0" marL="914400" rtl="0" algn="l">
+              <a:spcBef>
+                <a:spcPts val="0"/>
+              </a:spcBef>
+              <a:spcAft>
+                <a:spcPts val="0"/>
+              </a:spcAft>
+              <a:buClr>
+                <a:schemeClr val="dk1"/>
+              </a:buClr>
+              <a:buSzPts val="1400"/>
+              <a:buFont typeface="Fira Sans"/>
+              <a:buChar char="●"/>
+            </a:pPr>
+            <a:r>
+              <a:rPr lang="pt-BR">
+                <a:solidFill>
+                  <a:schemeClr val="dk1"/>
+                </a:solidFill>
+                <a:latin typeface="Fira Sans"/>
+                <a:ea typeface="Fira Sans"/>
+                <a:cs typeface="Fira Sans"/>
+                <a:sym typeface="Fira Sans"/>
+              </a:rPr>
+              <a:t>Função: </a:t>
+            </a:r>
+            <a:r>
+              <a:rPr lang="pt-BR">
+                <a:solidFill>
+                  <a:schemeClr val="dk1"/>
+                </a:solidFill>
+                <a:latin typeface="Fira Sans"/>
+                <a:ea typeface="Fira Sans"/>
+                <a:cs typeface="Fira Sans"/>
+                <a:sym typeface="Fira Sans"/>
+              </a:rPr>
+              <a:t>dgesv </a:t>
+            </a:r>
+            <a:endParaRPr>
+              <a:solidFill>
+                <a:schemeClr val="dk1"/>
+              </a:solidFill>
+              <a:latin typeface="Fira Sans"/>
+              <a:ea typeface="Fira Sans"/>
+              <a:cs typeface="Fira Sans"/>
+              <a:sym typeface="Fira Sans"/>
+            </a:endParaRPr>
+          </a:p>
+          <a:p>
+            <a:pPr indent="-317500" lvl="0" marL="914400" rtl="0" algn="l">
+              <a:spcBef>
+                <a:spcPts val="0"/>
+              </a:spcBef>
+              <a:spcAft>
+                <a:spcPts val="0"/>
+              </a:spcAft>
+              <a:buClr>
+                <a:schemeClr val="dk1"/>
+              </a:buClr>
+              <a:buSzPts val="1400"/>
+              <a:buFont typeface="Fira Sans"/>
+              <a:buChar char="●"/>
+            </a:pPr>
+            <a:r>
+              <a:rPr lang="pt-BR">
+                <a:solidFill>
+                  <a:schemeClr val="dk1"/>
+                </a:solidFill>
+                <a:latin typeface="Fira Sans"/>
+                <a:ea typeface="Fira Sans"/>
+                <a:cs typeface="Fira Sans"/>
+                <a:sym typeface="Fira Sans"/>
+              </a:rPr>
+              <a:t>Requerimento: Matriz qualquer</a:t>
+            </a:r>
+            <a:endParaRPr>
+              <a:solidFill>
+                <a:schemeClr val="dk1"/>
+              </a:solidFill>
+              <a:latin typeface="Fira Sans"/>
+              <a:ea typeface="Fira Sans"/>
+              <a:cs typeface="Fira Sans"/>
+              <a:sym typeface="Fira Sans"/>
+            </a:endParaRPr>
+          </a:p>
+          <a:p>
+            <a:pPr indent="-317500" lvl="0" marL="914400" rtl="0" algn="l">
+              <a:spcBef>
+                <a:spcPts val="0"/>
+              </a:spcBef>
+              <a:spcAft>
+                <a:spcPts val="0"/>
+              </a:spcAft>
+              <a:buClr>
+                <a:schemeClr val="dk1"/>
+              </a:buClr>
+              <a:buSzPts val="1400"/>
+              <a:buFont typeface="Fira Sans"/>
+              <a:buChar char="●"/>
+            </a:pPr>
+            <a:r>
+              <a:rPr lang="pt-BR">
+                <a:solidFill>
+                  <a:schemeClr val="dk1"/>
+                </a:solidFill>
+                <a:latin typeface="Fira Sans"/>
+                <a:ea typeface="Fira Sans"/>
+                <a:cs typeface="Fira Sans"/>
+                <a:sym typeface="Fira Sans"/>
+              </a:rPr>
+              <a:t>Entrada: A de dimensão (n,n)</a:t>
+            </a:r>
+            <a:endParaRPr>
+              <a:solidFill>
+                <a:schemeClr val="dk1"/>
+              </a:solidFill>
+              <a:latin typeface="Fira Sans"/>
+              <a:ea typeface="Fira Sans"/>
+              <a:cs typeface="Fira Sans"/>
+              <a:sym typeface="Fira Sans"/>
+            </a:endParaRPr>
+          </a:p>
+        </p:txBody>
+      </p:sp>
+      <p:sp>
+        <p:nvSpPr>
+          <p:cNvPr id="139" name="Google Shape;139;p21"/>
+          <p:cNvSpPr txBox="1"/>
+          <p:nvPr/>
+        </p:nvSpPr>
+        <p:spPr>
+          <a:xfrm>
+            <a:off x="6726313" y="1056750"/>
+            <a:ext cx="5426100" cy="1046700"/>
+          </a:xfrm>
+          <a:prstGeom prst="rect">
+            <a:avLst/>
+          </a:prstGeom>
+          <a:noFill/>
+          <a:ln>
+            <a:noFill/>
+          </a:ln>
+        </p:spPr>
+        <p:txBody>
+          <a:bodyPr anchorCtr="0" anchor="t" bIns="91425" lIns="91425" spcFirstLastPara="1" rIns="91425" wrap="square" tIns="91425">
+            <a:spAutoFit/>
+          </a:bodyPr>
+          <a:lstStyle/>
+          <a:p>
+            <a:pPr indent="0" lvl="0" marL="457200" rtl="0" algn="l">
+              <a:spcBef>
+                <a:spcPts val="0"/>
+              </a:spcBef>
+              <a:spcAft>
+                <a:spcPts val="0"/>
+              </a:spcAft>
+              <a:buNone/>
+            </a:pPr>
+            <a:r>
+              <a:rPr lang="pt-BR">
+                <a:latin typeface="Fira Sans"/>
+                <a:ea typeface="Fira Sans"/>
+                <a:cs typeface="Fira Sans"/>
+                <a:sym typeface="Fira Sans"/>
+              </a:rPr>
+              <a:t>Simétrico</a:t>
+            </a:r>
+            <a:r>
+              <a:rPr lang="pt-BR">
+                <a:latin typeface="Fira Sans"/>
+                <a:ea typeface="Fira Sans"/>
+                <a:cs typeface="Fira Sans"/>
+                <a:sym typeface="Fira Sans"/>
+              </a:rPr>
+              <a:t>:</a:t>
+            </a:r>
+            <a:endParaRPr>
+              <a:latin typeface="Fira Sans"/>
+              <a:ea typeface="Fira Sans"/>
+              <a:cs typeface="Fira Sans"/>
+              <a:sym typeface="Fira Sans"/>
+            </a:endParaRPr>
+          </a:p>
+          <a:p>
+            <a:pPr indent="-317500" lvl="0" marL="914400" rtl="0" algn="l">
+              <a:spcBef>
+                <a:spcPts val="0"/>
+              </a:spcBef>
+              <a:spcAft>
+                <a:spcPts val="0"/>
+              </a:spcAft>
+              <a:buClr>
+                <a:schemeClr val="dk1"/>
+              </a:buClr>
+              <a:buSzPts val="1400"/>
+              <a:buFont typeface="Fira Sans"/>
+              <a:buChar char="●"/>
+            </a:pPr>
+            <a:r>
+              <a:rPr lang="pt-BR">
+                <a:solidFill>
+                  <a:schemeClr val="dk1"/>
+                </a:solidFill>
+                <a:latin typeface="Fira Sans"/>
+                <a:ea typeface="Fira Sans"/>
+                <a:cs typeface="Fira Sans"/>
+                <a:sym typeface="Fira Sans"/>
+              </a:rPr>
+              <a:t>Função: dposv</a:t>
+            </a:r>
+            <a:endParaRPr>
+              <a:solidFill>
+                <a:schemeClr val="dk1"/>
+              </a:solidFill>
+              <a:latin typeface="Fira Sans"/>
+              <a:ea typeface="Fira Sans"/>
+              <a:cs typeface="Fira Sans"/>
+              <a:sym typeface="Fira Sans"/>
+            </a:endParaRPr>
+          </a:p>
+          <a:p>
+            <a:pPr indent="-317500" lvl="0" marL="914400" rtl="0" algn="l">
+              <a:spcBef>
+                <a:spcPts val="0"/>
+              </a:spcBef>
+              <a:spcAft>
+                <a:spcPts val="0"/>
+              </a:spcAft>
+              <a:buClr>
+                <a:schemeClr val="dk1"/>
+              </a:buClr>
+              <a:buSzPts val="1400"/>
+              <a:buFont typeface="Fira Sans"/>
+              <a:buChar char="●"/>
+            </a:pPr>
+            <a:r>
+              <a:rPr lang="pt-BR">
+                <a:solidFill>
+                  <a:schemeClr val="dk1"/>
+                </a:solidFill>
+                <a:latin typeface="Fira Sans"/>
+                <a:ea typeface="Fira Sans"/>
+                <a:cs typeface="Fira Sans"/>
+                <a:sym typeface="Fira Sans"/>
+              </a:rPr>
+              <a:t>Requerimento: Matriz simétrica positiva definida</a:t>
+            </a:r>
+            <a:endParaRPr>
+              <a:solidFill>
+                <a:schemeClr val="dk1"/>
+              </a:solidFill>
+              <a:latin typeface="Fira Sans"/>
+              <a:ea typeface="Fira Sans"/>
+              <a:cs typeface="Fira Sans"/>
+              <a:sym typeface="Fira Sans"/>
+            </a:endParaRPr>
+          </a:p>
+          <a:p>
+            <a:pPr indent="-317500" lvl="0" marL="914400" rtl="0" algn="l">
+              <a:spcBef>
+                <a:spcPts val="0"/>
+              </a:spcBef>
+              <a:spcAft>
+                <a:spcPts val="0"/>
+              </a:spcAft>
+              <a:buClr>
+                <a:schemeClr val="dk1"/>
+              </a:buClr>
+              <a:buSzPts val="1400"/>
+              <a:buFont typeface="Fira Sans"/>
+              <a:buChar char="●"/>
+            </a:pPr>
+            <a:r>
+              <a:rPr lang="pt-BR">
+                <a:solidFill>
+                  <a:schemeClr val="dk1"/>
+                </a:solidFill>
+                <a:latin typeface="Fira Sans"/>
+                <a:ea typeface="Fira Sans"/>
+                <a:cs typeface="Fira Sans"/>
+                <a:sym typeface="Fira Sans"/>
+              </a:rPr>
+              <a:t>Entrada: Matriz A triangular *</a:t>
+            </a:r>
+            <a:endParaRPr>
+              <a:latin typeface="Fira Sans"/>
+              <a:ea typeface="Fira Sans"/>
+              <a:cs typeface="Fira Sans"/>
+              <a:sym typeface="Fira Sans"/>
+            </a:endParaRPr>
+          </a:p>
+        </p:txBody>
+      </p:sp>
+      <p:pic>
+        <p:nvPicPr>
           <p:cNvPr id="140" name="Google Shape;140;p21"/>
+          <p:cNvPicPr preferRelativeResize="0"/>
+          <p:nvPr/>
+        </p:nvPicPr>
+        <p:blipFill>
+          <a:blip r:embed="rId3">
+            <a:alphaModFix/>
+          </a:blip>
+          <a:stretch>
+            <a:fillRect/>
+          </a:stretch>
+        </p:blipFill>
+        <p:spPr>
+          <a:xfrm>
+            <a:off x="832975" y="2103438"/>
+            <a:ext cx="10526060" cy="3941887"/>
+          </a:xfrm>
+          <a:prstGeom prst="rect">
+            <a:avLst/>
+          </a:prstGeom>
+          <a:noFill/>
+          <a:ln>
+            <a:noFill/>
+          </a:ln>
+        </p:spPr>
+      </p:pic>
+    </p:spTree>
+  </p:cSld>
+  <p:clrMapOvr>
+    <a:masterClrMapping/>
+  </p:clrMapOvr>
+  <p:timing>
+    <p:tnLst>
+      <p:par>
+        <p:cTn dur="indefinite" nodeType="tmRoot" restart="never">
+          <p:childTnLst>
+            <p:seq concurrent="1" nextAc="seek">
+              <p:cTn dur="indefinite" id="2" nodeType="mainSeq">
+                <p:childTnLst>
+                  <p:par>
+                    <p:cTn fill="hold">
+                      <p:stCondLst>
+                        <p:cond delay="indefinite"/>
+                      </p:stCondLst>
+                      <p:childTnLst>
+                        <p:par>
+                          <p:cTn fill="hold">
+                            <p:stCondLst>
+                              <p:cond delay="0"/>
+                            </p:stCondLst>
+                            <p:childTnLst>
+                              <p:par>
+                                <p:cTn fill="hold" nodeType="clickEffect" presetClass="entr" presetID="10" presetSubtype="0">
+                                  <p:stCondLst>
+                                    <p:cond delay="0"/>
+                                  </p:stCondLst>
+                                  <p:childTnLst>
+                                    <p:set>
+                                      <p:cBhvr>
+                                        <p:cTn dur="1" fill="hold">
+                                          <p:stCondLst>
+                                            <p:cond delay="0"/>
+                                          </p:stCondLst>
+                                        </p:cTn>
+                                        <p:tgtEl>
+                                          <p:spTgt spid="138"/>
+                                        </p:tgtEl>
+                                        <p:attrNameLst>
+                                          <p:attrName>style.visibility</p:attrName>
+                                        </p:attrNameLst>
+                                      </p:cBhvr>
+                                      <p:to>
+                                        <p:strVal val="visible"/>
+                                      </p:to>
+                                    </p:set>
+                                    <p:animEffect filter="fade" transition="in">
+                                      <p:cBhvr>
+                                        <p:cTn dur="1000"/>
+                                        <p:tgtEl>
+                                          <p:spTgt spid="138"/>
+                                        </p:tgtEl>
+                                      </p:cBhvr>
+                                    </p:animEffect>
+                                  </p:childTnLst>
+                                </p:cTn>
+                              </p:par>
+                            </p:childTnLst>
+                          </p:cTn>
+                        </p:par>
+                      </p:childTnLst>
+                    </p:cTn>
+                  </p:par>
+                  <p:par>
+                    <p:cTn fill="hold">
+                      <p:stCondLst>
+                        <p:cond delay="indefinite"/>
+                      </p:stCondLst>
+                      <p:childTnLst>
+                        <p:par>
+                          <p:cTn fill="hold">
+                            <p:stCondLst>
+                              <p:cond delay="0"/>
+                            </p:stCondLst>
+                            <p:childTnLst>
+                              <p:par>
+                                <p:cTn fill="hold" nodeType="clickEffect" presetClass="entr" presetID="10" presetSubtype="0">
+                                  <p:stCondLst>
+                                    <p:cond delay="0"/>
+                                  </p:stCondLst>
+                                  <p:childTnLst>
+                                    <p:set>
+                                      <p:cBhvr>
+                                        <p:cTn dur="1" fill="hold">
+                                          <p:stCondLst>
+                                            <p:cond delay="0"/>
+                                          </p:stCondLst>
+                                        </p:cTn>
+                                        <p:tgtEl>
+                                          <p:spTgt spid="139"/>
+                                        </p:tgtEl>
+                                        <p:attrNameLst>
+                                          <p:attrName>style.visibility</p:attrName>
+                                        </p:attrNameLst>
+                                      </p:cBhvr>
+                                      <p:to>
+                                        <p:strVal val="visible"/>
+                                      </p:to>
+                                    </p:set>
+                                    <p:animEffect filter="fade" transition="in">
+                                      <p:cBhvr>
+                                        <p:cTn dur="1000"/>
+                                        <p:tgtEl>
+                                          <p:spTgt spid="139"/>
+                                        </p:tgtEl>
+                                      </p:cBhvr>
+                                    </p:animEffect>
+                                  </p:childTnLst>
+                                </p:cTn>
+                              </p:par>
+                            </p:childTnLst>
+                          </p:cTn>
+                        </p:par>
+                      </p:childTnLst>
+                    </p:cTn>
+                  </p:par>
+                  <p:par>
+                    <p:cTn fill="hold">
+                      <p:stCondLst>
+                        <p:cond delay="indefinite"/>
+                      </p:stCondLst>
+                      <p:childTnLst>
+                        <p:par>
+                          <p:cTn fill="hold">
+                            <p:stCondLst>
+                              <p:cond delay="0"/>
+                            </p:stCondLst>
+                            <p:childTnLst>
+                              <p:par>
+                                <p:cTn fill="hold" nodeType="clickEffect" presetClass="entr" presetID="10" presetSubtype="0">
+                                  <p:stCondLst>
+                                    <p:cond delay="0"/>
+                                  </p:stCondLst>
+                                  <p:childTnLst>
+                                    <p:set>
+                                      <p:cBhvr>
+                                        <p:cTn dur="1" fill="hold">
+                                          <p:stCondLst>
+                                            <p:cond delay="0"/>
+                                          </p:stCondLst>
+                                        </p:cTn>
+                                        <p:tgtEl>
+                                          <p:spTgt spid="140"/>
+                                        </p:tgtEl>
+                                        <p:attrNameLst>
+                                          <p:attrName>style.visibility</p:attrName>
+                                        </p:attrNameLst>
+                                      </p:cBhvr>
+                                      <p:to>
+                                        <p:strVal val="visible"/>
+                                      </p:to>
+                                    </p:set>
+                                    <p:animEffect filter="fade" transition="in">
+                                      <p:cBhvr>
+                                        <p:cTn dur="1000"/>
+                                        <p:tgtEl>
+                                          <p:spTgt spid="140"/>
+                                        </p:tgtEl>
+                                      </p:cBhvr>
+                                    </p:animEffect>
+                                  </p:childTnLst>
+                                </p:cTn>
+                              </p:par>
+                            </p:childTnLst>
+                          </p:cTn>
+                        </p:par>
+                      </p:childTnLst>
+                    </p:cTn>
+                  </p:par>
+                </p:childTnLst>
+              </p:cTn>
+              <p:prevCondLst>
+                <p:cond evt="onPrev">
+                  <p:tgtEl>
+                    <p:sldTgt/>
+                  </p:tgtEl>
+                </p:cond>
+              </p:prevCondLst>
+              <p:nextCondLst>
+                <p:cond evt="onNext">
+                  <p:tgtEl>
+                    <p:sldTgt/>
+                  </p:tgtEl>
+                </p:cond>
+              </p:nextCondLst>
+            </p:seq>
+          </p:childTnLst>
+        </p:cTn>
+      </p:par>
+    </p:tnLst>
+  </p:timing>
+</p:sld>
+</file>
+
+<file path=ppt/slides/slide6.xml><?xml version="1.0" encoding="utf-8"?>
+<p:sld xmlns:a="http://schemas.openxmlformats.org/drawingml/2006/main" xmlns:r="http://schemas.openxmlformats.org/officeDocument/2006/relationships" xmlns:mc="http://schemas.openxmlformats.org/markup-compatibility/2006" xmlns:mv="urn:schemas-microsoft-com:mac:vml" xmlns:p="http://schemas.openxmlformats.org/presentationml/2006/main" xmlns:c="http://schemas.openxmlformats.org/drawingml/2006/chart" xmlns:dgm="http://schemas.openxmlformats.org/drawingml/2006/diagram" xmlns:o="urn:schemas-microsoft-com:office:office" xmlns:v="urn:schemas-microsoft-com:vml" xmlns:pvml="urn:schemas-microsoft-com:office:powerpoint" xmlns:com="http://schemas.openxmlformats.org/drawingml/2006/compatibility" xmlns:p14="http://schemas.microsoft.com/office/powerpoint/2010/main" xmlns:p15="http://schemas.microsoft.com/office/powerpoint/2012/main" xmlns:ahyp="http://schemas.microsoft.com/office/drawing/2018/hyperlinkcolor">
+  <p:cSld>
+    <p:spTree>
+      <p:nvGrpSpPr>
+        <p:cNvPr id="145" name="Shape 145"/>
+        <p:cNvGrpSpPr/>
+        <p:nvPr/>
+      </p:nvGrpSpPr>
+      <p:grpSpPr>
+        <a:xfrm>
+          <a:off x="0" y="0"/>
+          <a:ext cx="0" cy="0"/>
+          <a:chOff x="0" y="0"/>
+          <a:chExt cx="0" cy="0"/>
+        </a:xfrm>
+      </p:grpSpPr>
+      <p:sp>
+        <p:nvSpPr>
+          <p:cNvPr id="146" name="Google Shape;146;p22"/>
+          <p:cNvSpPr txBox="1"/>
+          <p:nvPr>
+            <p:ph type="title"/>
+          </p:nvPr>
+        </p:nvSpPr>
+        <p:spPr>
+          <a:xfrm>
+            <a:off x="1155469" y="66183"/>
+            <a:ext cx="10914600" cy="1334400"/>
+          </a:xfrm>
+          <a:prstGeom prst="rect">
+            <a:avLst/>
+          </a:prstGeom>
+        </p:spPr>
+        <p:txBody>
+          <a:bodyPr anchorCtr="0" anchor="ctr" bIns="45700" lIns="91425" spcFirstLastPara="1" rIns="91425" wrap="square" tIns="45700">
+            <a:normAutofit/>
+          </a:bodyPr>
+          <a:lstStyle/>
+          <a:p>
+            <a:pPr indent="0" lvl="0" marL="0" rtl="0" algn="l">
+              <a:spcBef>
+                <a:spcPts val="0"/>
+              </a:spcBef>
+              <a:spcAft>
+                <a:spcPts val="0"/>
+              </a:spcAft>
+              <a:buNone/>
+            </a:pPr>
+            <a:r>
+              <a:rPr lang="pt-BR"/>
+              <a:t>Caso Banda</a:t>
+            </a:r>
+            <a:endParaRPr/>
+          </a:p>
+        </p:txBody>
+      </p:sp>
+      <p:sp>
+        <p:nvSpPr>
+          <p:cNvPr id="147" name="Google Shape;147;p22"/>
+          <p:cNvSpPr txBox="1"/>
+          <p:nvPr>
+            <p:ph idx="12" type="sldNum"/>
+          </p:nvPr>
+        </p:nvSpPr>
+        <p:spPr>
+          <a:xfrm>
+            <a:off x="8801100" y="6350138"/>
+            <a:ext cx="2743200" cy="365100"/>
+          </a:xfrm>
+          <a:prstGeom prst="rect">
+            <a:avLst/>
+          </a:prstGeom>
+        </p:spPr>
+        <p:txBody>
+          <a:bodyPr anchorCtr="0" anchor="ctr" bIns="45700" lIns="91425" spcFirstLastPara="1" rIns="91425" wrap="square" tIns="45700">
+            <a:noAutofit/>
+          </a:bodyPr>
+          <a:lstStyle/>
+          <a:p>
+            <a:pPr indent="0" lvl="0" marL="0" rtl="0" algn="r">
+              <a:spcBef>
+                <a:spcPts val="0"/>
+              </a:spcBef>
+              <a:spcAft>
+                <a:spcPts val="0"/>
+              </a:spcAft>
+              <a:buNone/>
+            </a:pPr>
+            <a:fld id="{00000000-1234-1234-1234-123412341234}" type="slidenum">
+              <a:rPr lang="pt-BR"/>
+              <a:t>‹#›</a:t>
+            </a:fld>
+            <a:endParaRPr sz="3200"/>
+          </a:p>
+        </p:txBody>
+      </p:sp>
+      <p:sp>
+        <p:nvSpPr>
+          <p:cNvPr id="148" name="Google Shape;148;p22"/>
           <p:cNvSpPr txBox="1"/>
           <p:nvPr/>
         </p:nvSpPr>
@@ -15375,7 +15701,7 @@
       </p:sp>
       <p:sp>
         <p:nvSpPr>
-          <p:cNvPr id="141" name="Google Shape;141;p21"/>
+          <p:cNvPr id="149" name="Google Shape;149;p22"/>
           <p:cNvSpPr txBox="1"/>
           <p:nvPr/>
         </p:nvSpPr>
@@ -15535,7 +15861,7 @@
       </p:sp>
       <p:pic>
         <p:nvPicPr>
-          <p:cNvPr id="142" name="Google Shape;142;p21"/>
+          <p:cNvPr id="150" name="Google Shape;150;p22"/>
           <p:cNvPicPr preferRelativeResize="0"/>
           <p:nvPr/>
         </p:nvPicPr>
@@ -15600,7 +15926,7 @@
                                           </p:stCondLst>
                                         </p:cTn>
                                         <p:tgtEl>
-                                          <p:spTgt spid="140"/>
+                                          <p:spTgt spid="148"/>
                                         </p:tgtEl>
                                         <p:attrNameLst>
                                           <p:attrName>style.visibility</p:attrName>
@@ -15614,7 +15940,7 @@
                                       <p:cBhvr>
                                         <p:cTn dur="1000"/>
                                         <p:tgtEl>
-                                          <p:spTgt spid="140"/>
+                                          <p:spTgt spid="148"/>
                                         </p:tgtEl>
                                       </p:cBhvr>
                                     </p:animEffect>
@@ -15653,7 +15979,7 @@
                                           </p:stCondLst>
                                         </p:cTn>
                                         <p:tgtEl>
-                                          <p:spTgt spid="141"/>
+                                          <p:spTgt spid="149"/>
                                         </p:tgtEl>
                                         <p:attrNameLst>
                                           <p:attrName>style.visibility</p:attrName>
@@ -15667,7 +15993,7 @@
                                       <p:cBhvr>
                                         <p:cTn dur="1000"/>
                                         <p:tgtEl>
-                                          <p:spTgt spid="141"/>
+                                          <p:spTgt spid="149"/>
                                         </p:tgtEl>
                                       </p:cBhvr>
                                     </p:animEffect>
@@ -15680,545 +16006,6 @@
                       </p:childTnLst>
                     </p:cTn>
                   </p:par>
-                  <p:par>
-                    <p:cTn fill="hold">
-                      <p:stCondLst>
-                        <p:cond delay="indefinite"/>
-                      </p:stCondLst>
-                      <p:childTnLst>
-                        <p:par>
-                          <p:cTn fill="hold">
-                            <p:stCondLst>
-                              <p:cond delay="0"/>
-                            </p:stCondLst>
-                            <p:childTnLst>
-                              <p:par>
-                                <p:cTn fill="hold" nodeType="clickEffect" presetClass="entr" presetID="10" presetSubtype="0">
-                                  <p:stCondLst>
-                                    <p:cond delay="0"/>
-                                  </p:stCondLst>
-                                  <p:childTnLst>
-                                    <p:set>
-                                      <p:cBhvr>
-                                        <p:cTn dur="1" fill="hold">
-                                          <p:stCondLst>
-                                            <p:cond delay="0"/>
-                                          </p:stCondLst>
-                                        </p:cTn>
-                                        <p:tgtEl>
-                                          <p:spTgt spid="142"/>
-                                        </p:tgtEl>
-                                        <p:attrNameLst>
-                                          <p:attrName>style.visibility</p:attrName>
-                                        </p:attrNameLst>
-                                      </p:cBhvr>
-                                      <p:to>
-                                        <p:strVal val="visible"/>
-                                      </p:to>
-                                    </p:set>
-                                    <p:animEffect filter="fade" transition="in">
-                                      <p:cBhvr>
-                                        <p:cTn dur="1000"/>
-                                        <p:tgtEl>
-                                          <p:spTgt spid="142"/>
-                                        </p:tgtEl>
-                                      </p:cBhvr>
-                                    </p:animEffect>
-                                  </p:childTnLst>
-                                </p:cTn>
-                              </p:par>
-                            </p:childTnLst>
-                          </p:cTn>
-                        </p:par>
-                      </p:childTnLst>
-                    </p:cTn>
-                  </p:par>
-                </p:childTnLst>
-              </p:cTn>
-              <p:prevCondLst>
-                <p:cond evt="onPrev">
-                  <p:tgtEl>
-                    <p:sldTgt/>
-                  </p:tgtEl>
-                </p:cond>
-              </p:prevCondLst>
-              <p:nextCondLst>
-                <p:cond evt="onNext">
-                  <p:tgtEl>
-                    <p:sldTgt/>
-                  </p:tgtEl>
-                </p:cond>
-              </p:nextCondLst>
-            </p:seq>
-          </p:childTnLst>
-        </p:cTn>
-      </p:par>
-    </p:tnLst>
-  </p:timing>
-</p:sld>
-</file>
-
-<file path=ppt/slides/slide6.xml><?xml version="1.0" encoding="utf-8"?>
-<p:sld xmlns:a="http://schemas.openxmlformats.org/drawingml/2006/main" xmlns:r="http://schemas.openxmlformats.org/officeDocument/2006/relationships" xmlns:mc="http://schemas.openxmlformats.org/markup-compatibility/2006" xmlns:mv="urn:schemas-microsoft-com:mac:vml" xmlns:p="http://schemas.openxmlformats.org/presentationml/2006/main" xmlns:c="http://schemas.openxmlformats.org/drawingml/2006/chart" xmlns:dgm="http://schemas.openxmlformats.org/drawingml/2006/diagram" xmlns:o="urn:schemas-microsoft-com:office:office" xmlns:v="urn:schemas-microsoft-com:vml" xmlns:pvml="urn:schemas-microsoft-com:office:powerpoint" xmlns:com="http://schemas.openxmlformats.org/drawingml/2006/compatibility" xmlns:p14="http://schemas.microsoft.com/office/powerpoint/2010/main" xmlns:p15="http://schemas.microsoft.com/office/powerpoint/2012/main" xmlns:ahyp="http://schemas.microsoft.com/office/drawing/2018/hyperlinkcolor">
-  <p:cSld>
-    <p:spTree>
-      <p:nvGrpSpPr>
-        <p:cNvPr id="147" name="Shape 147"/>
-        <p:cNvGrpSpPr/>
-        <p:nvPr/>
-      </p:nvGrpSpPr>
-      <p:grpSpPr>
-        <a:xfrm>
-          <a:off x="0" y="0"/>
-          <a:ext cx="0" cy="0"/>
-          <a:chOff x="0" y="0"/>
-          <a:chExt cx="0" cy="0"/>
-        </a:xfrm>
-      </p:grpSpPr>
-      <p:sp>
-        <p:nvSpPr>
-          <p:cNvPr id="148" name="Google Shape;148;p22"/>
-          <p:cNvSpPr txBox="1"/>
-          <p:nvPr>
-            <p:ph type="title"/>
-          </p:nvPr>
-        </p:nvSpPr>
-        <p:spPr>
-          <a:xfrm>
-            <a:off x="1155469" y="66183"/>
-            <a:ext cx="10914600" cy="1334400"/>
-          </a:xfrm>
-          <a:prstGeom prst="rect">
-            <a:avLst/>
-          </a:prstGeom>
-        </p:spPr>
-        <p:txBody>
-          <a:bodyPr anchorCtr="0" anchor="ctr" bIns="45700" lIns="91425" spcFirstLastPara="1" rIns="91425" wrap="square" tIns="45700">
-            <a:normAutofit/>
-          </a:bodyPr>
-          <a:lstStyle/>
-          <a:p>
-            <a:pPr indent="0" lvl="0" marL="0" rtl="0" algn="l">
-              <a:spcBef>
-                <a:spcPts val="0"/>
-              </a:spcBef>
-              <a:spcAft>
-                <a:spcPts val="0"/>
-              </a:spcAft>
-              <a:buNone/>
-            </a:pPr>
-            <a:r>
-              <a:rPr lang="pt-BR"/>
-              <a:t>Caso Tridiagonal</a:t>
-            </a:r>
-            <a:endParaRPr/>
-          </a:p>
-        </p:txBody>
-      </p:sp>
-      <p:sp>
-        <p:nvSpPr>
-          <p:cNvPr id="149" name="Google Shape;149;p22"/>
-          <p:cNvSpPr txBox="1"/>
-          <p:nvPr>
-            <p:ph idx="12" type="sldNum"/>
-          </p:nvPr>
-        </p:nvSpPr>
-        <p:spPr>
-          <a:xfrm>
-            <a:off x="8801100" y="6350138"/>
-            <a:ext cx="2743200" cy="365100"/>
-          </a:xfrm>
-          <a:prstGeom prst="rect">
-            <a:avLst/>
-          </a:prstGeom>
-        </p:spPr>
-        <p:txBody>
-          <a:bodyPr anchorCtr="0" anchor="ctr" bIns="45700" lIns="91425" spcFirstLastPara="1" rIns="91425" wrap="square" tIns="45700">
-            <a:noAutofit/>
-          </a:bodyPr>
-          <a:lstStyle/>
-          <a:p>
-            <a:pPr indent="0" lvl="0" marL="0" rtl="0" algn="r">
-              <a:spcBef>
-                <a:spcPts val="0"/>
-              </a:spcBef>
-              <a:spcAft>
-                <a:spcPts val="0"/>
-              </a:spcAft>
-              <a:buNone/>
-            </a:pPr>
-            <a:fld id="{00000000-1234-1234-1234-123412341234}" type="slidenum">
-              <a:rPr lang="pt-BR"/>
-              <a:t>‹#›</a:t>
-            </a:fld>
-            <a:endParaRPr sz="3200"/>
-          </a:p>
-        </p:txBody>
-      </p:sp>
-      <p:sp>
-        <p:nvSpPr>
-          <p:cNvPr id="150" name="Google Shape;150;p22"/>
-          <p:cNvSpPr txBox="1"/>
-          <p:nvPr/>
-        </p:nvSpPr>
-        <p:spPr>
-          <a:xfrm>
-            <a:off x="951638" y="1056750"/>
-            <a:ext cx="5426100" cy="923400"/>
-          </a:xfrm>
-          <a:prstGeom prst="rect">
-            <a:avLst/>
-          </a:prstGeom>
-          <a:noFill/>
-          <a:ln>
-            <a:noFill/>
-          </a:ln>
-        </p:spPr>
-        <p:txBody>
-          <a:bodyPr anchorCtr="0" anchor="t" bIns="91425" lIns="91425" spcFirstLastPara="1" rIns="91425" wrap="square" tIns="91425">
-            <a:spAutoFit/>
-          </a:bodyPr>
-          <a:lstStyle/>
-          <a:p>
-            <a:pPr indent="0" lvl="0" marL="457200" rtl="0" algn="l">
-              <a:spcBef>
-                <a:spcPts val="0"/>
-              </a:spcBef>
-              <a:spcAft>
-                <a:spcPts val="0"/>
-              </a:spcAft>
-              <a:buNone/>
-            </a:pPr>
-            <a:r>
-              <a:rPr lang="pt-BR" sz="1200">
-                <a:latin typeface="Fira Sans"/>
-                <a:ea typeface="Fira Sans"/>
-                <a:cs typeface="Fira Sans"/>
-                <a:sym typeface="Fira Sans"/>
-              </a:rPr>
-              <a:t>Assimétrico:</a:t>
-            </a:r>
-            <a:endParaRPr sz="1200">
-              <a:latin typeface="Fira Sans"/>
-              <a:ea typeface="Fira Sans"/>
-              <a:cs typeface="Fira Sans"/>
-              <a:sym typeface="Fira Sans"/>
-            </a:endParaRPr>
-          </a:p>
-          <a:p>
-            <a:pPr indent="-304800" lvl="0" marL="914400" rtl="0" algn="l">
-              <a:spcBef>
-                <a:spcPts val="0"/>
-              </a:spcBef>
-              <a:spcAft>
-                <a:spcPts val="0"/>
-              </a:spcAft>
-              <a:buClr>
-                <a:schemeClr val="dk1"/>
-              </a:buClr>
-              <a:buSzPts val="1200"/>
-              <a:buFont typeface="Fira Sans"/>
-              <a:buChar char="●"/>
-            </a:pPr>
-            <a:r>
-              <a:rPr lang="pt-BR" sz="1200">
-                <a:solidFill>
-                  <a:schemeClr val="dk1"/>
-                </a:solidFill>
-                <a:latin typeface="Fira Sans"/>
-                <a:ea typeface="Fira Sans"/>
-                <a:cs typeface="Fira Sans"/>
-                <a:sym typeface="Fira Sans"/>
-              </a:rPr>
-              <a:t>Função: dgtsv</a:t>
-            </a:r>
-            <a:endParaRPr sz="1200">
-              <a:solidFill>
-                <a:schemeClr val="dk1"/>
-              </a:solidFill>
-              <a:latin typeface="Fira Sans"/>
-              <a:ea typeface="Fira Sans"/>
-              <a:cs typeface="Fira Sans"/>
-              <a:sym typeface="Fira Sans"/>
-            </a:endParaRPr>
-          </a:p>
-          <a:p>
-            <a:pPr indent="-304800" lvl="0" marL="914400" rtl="0" algn="l">
-              <a:spcBef>
-                <a:spcPts val="0"/>
-              </a:spcBef>
-              <a:spcAft>
-                <a:spcPts val="0"/>
-              </a:spcAft>
-              <a:buClr>
-                <a:schemeClr val="dk1"/>
-              </a:buClr>
-              <a:buSzPts val="1200"/>
-              <a:buFont typeface="Fira Sans"/>
-              <a:buChar char="●"/>
-            </a:pPr>
-            <a:r>
-              <a:rPr lang="pt-BR" sz="1200">
-                <a:solidFill>
-                  <a:schemeClr val="dk1"/>
-                </a:solidFill>
-                <a:latin typeface="Fira Sans"/>
-                <a:ea typeface="Fira Sans"/>
-                <a:cs typeface="Fira Sans"/>
-                <a:sym typeface="Fira Sans"/>
-              </a:rPr>
-              <a:t>Requerimento: Matriz Tridiagonal</a:t>
-            </a:r>
-            <a:endParaRPr sz="1200">
-              <a:solidFill>
-                <a:schemeClr val="dk1"/>
-              </a:solidFill>
-              <a:latin typeface="Fira Sans"/>
-              <a:ea typeface="Fira Sans"/>
-              <a:cs typeface="Fira Sans"/>
-              <a:sym typeface="Fira Sans"/>
-            </a:endParaRPr>
-          </a:p>
-          <a:p>
-            <a:pPr indent="-304800" lvl="0" marL="914400" rtl="0" algn="l">
-              <a:spcBef>
-                <a:spcPts val="0"/>
-              </a:spcBef>
-              <a:spcAft>
-                <a:spcPts val="0"/>
-              </a:spcAft>
-              <a:buClr>
-                <a:schemeClr val="dk1"/>
-              </a:buClr>
-              <a:buSzPts val="1200"/>
-              <a:buFont typeface="Fira Sans"/>
-              <a:buChar char="●"/>
-            </a:pPr>
-            <a:r>
-              <a:rPr lang="pt-BR" sz="1200">
-                <a:solidFill>
-                  <a:schemeClr val="dk1"/>
-                </a:solidFill>
-                <a:latin typeface="Fira Sans"/>
-                <a:ea typeface="Fira Sans"/>
-                <a:cs typeface="Fira Sans"/>
-                <a:sym typeface="Fira Sans"/>
-              </a:rPr>
-              <a:t>Entrada: Vetores DL (n-1) , D (n), DU (n-1)</a:t>
-            </a:r>
-            <a:endParaRPr sz="1200">
-              <a:solidFill>
-                <a:schemeClr val="dk1"/>
-              </a:solidFill>
-              <a:latin typeface="Fira Sans"/>
-              <a:ea typeface="Fira Sans"/>
-              <a:cs typeface="Fira Sans"/>
-              <a:sym typeface="Fira Sans"/>
-            </a:endParaRPr>
-          </a:p>
-        </p:txBody>
-      </p:sp>
-      <p:sp>
-        <p:nvSpPr>
-          <p:cNvPr id="151" name="Google Shape;151;p22"/>
-          <p:cNvSpPr txBox="1"/>
-          <p:nvPr/>
-        </p:nvSpPr>
-        <p:spPr>
-          <a:xfrm>
-            <a:off x="6726313" y="1056750"/>
-            <a:ext cx="5426100" cy="923400"/>
-          </a:xfrm>
-          <a:prstGeom prst="rect">
-            <a:avLst/>
-          </a:prstGeom>
-          <a:noFill/>
-          <a:ln>
-            <a:noFill/>
-          </a:ln>
-        </p:spPr>
-        <p:txBody>
-          <a:bodyPr anchorCtr="0" anchor="t" bIns="91425" lIns="91425" spcFirstLastPara="1" rIns="91425" wrap="square" tIns="91425">
-            <a:spAutoFit/>
-          </a:bodyPr>
-          <a:lstStyle/>
-          <a:p>
-            <a:pPr indent="0" lvl="0" marL="457200" rtl="0" algn="l">
-              <a:spcBef>
-                <a:spcPts val="0"/>
-              </a:spcBef>
-              <a:spcAft>
-                <a:spcPts val="0"/>
-              </a:spcAft>
-              <a:buNone/>
-            </a:pPr>
-            <a:r>
-              <a:rPr lang="pt-BR" sz="1200">
-                <a:latin typeface="Fira Sans"/>
-                <a:ea typeface="Fira Sans"/>
-                <a:cs typeface="Fira Sans"/>
-                <a:sym typeface="Fira Sans"/>
-              </a:rPr>
-              <a:t>Simétrico:</a:t>
-            </a:r>
-            <a:endParaRPr sz="1200">
-              <a:latin typeface="Fira Sans"/>
-              <a:ea typeface="Fira Sans"/>
-              <a:cs typeface="Fira Sans"/>
-              <a:sym typeface="Fira Sans"/>
-            </a:endParaRPr>
-          </a:p>
-          <a:p>
-            <a:pPr indent="-304800" lvl="0" marL="914400" rtl="0" algn="l">
-              <a:spcBef>
-                <a:spcPts val="0"/>
-              </a:spcBef>
-              <a:spcAft>
-                <a:spcPts val="0"/>
-              </a:spcAft>
-              <a:buClr>
-                <a:schemeClr val="dk1"/>
-              </a:buClr>
-              <a:buSzPts val="1200"/>
-              <a:buFont typeface="Fira Sans"/>
-              <a:buChar char="●"/>
-            </a:pPr>
-            <a:r>
-              <a:rPr lang="pt-BR" sz="1200">
-                <a:solidFill>
-                  <a:schemeClr val="dk1"/>
-                </a:solidFill>
-                <a:latin typeface="Fira Sans"/>
-                <a:ea typeface="Fira Sans"/>
-                <a:cs typeface="Fira Sans"/>
-                <a:sym typeface="Fira Sans"/>
-              </a:rPr>
-              <a:t>Função: dptsv</a:t>
-            </a:r>
-            <a:endParaRPr sz="1200">
-              <a:solidFill>
-                <a:schemeClr val="dk1"/>
-              </a:solidFill>
-              <a:latin typeface="Fira Sans"/>
-              <a:ea typeface="Fira Sans"/>
-              <a:cs typeface="Fira Sans"/>
-              <a:sym typeface="Fira Sans"/>
-            </a:endParaRPr>
-          </a:p>
-          <a:p>
-            <a:pPr indent="-304800" lvl="0" marL="914400" rtl="0" algn="l">
-              <a:spcBef>
-                <a:spcPts val="0"/>
-              </a:spcBef>
-              <a:spcAft>
-                <a:spcPts val="0"/>
-              </a:spcAft>
-              <a:buClr>
-                <a:schemeClr val="dk1"/>
-              </a:buClr>
-              <a:buSzPts val="1200"/>
-              <a:buFont typeface="Fira Sans"/>
-              <a:buChar char="●"/>
-            </a:pPr>
-            <a:r>
-              <a:rPr lang="pt-BR" sz="1200">
-                <a:solidFill>
-                  <a:schemeClr val="dk1"/>
-                </a:solidFill>
-                <a:latin typeface="Fira Sans"/>
-                <a:ea typeface="Fira Sans"/>
-                <a:cs typeface="Fira Sans"/>
-                <a:sym typeface="Fira Sans"/>
-              </a:rPr>
-              <a:t>Requerimento: Matriz Tridiagonal simétrica positiva definida</a:t>
-            </a:r>
-            <a:endParaRPr sz="1200">
-              <a:solidFill>
-                <a:schemeClr val="dk1"/>
-              </a:solidFill>
-              <a:latin typeface="Fira Sans"/>
-              <a:ea typeface="Fira Sans"/>
-              <a:cs typeface="Fira Sans"/>
-              <a:sym typeface="Fira Sans"/>
-            </a:endParaRPr>
-          </a:p>
-          <a:p>
-            <a:pPr indent="-304800" lvl="0" marL="914400" rtl="0" algn="l">
-              <a:spcBef>
-                <a:spcPts val="0"/>
-              </a:spcBef>
-              <a:spcAft>
-                <a:spcPts val="0"/>
-              </a:spcAft>
-              <a:buClr>
-                <a:schemeClr val="dk1"/>
-              </a:buClr>
-              <a:buSzPts val="1200"/>
-              <a:buFont typeface="Fira Sans"/>
-              <a:buChar char="●"/>
-            </a:pPr>
-            <a:r>
-              <a:rPr lang="pt-BR" sz="1200">
-                <a:solidFill>
-                  <a:schemeClr val="dk1"/>
-                </a:solidFill>
-                <a:latin typeface="Fira Sans"/>
-                <a:ea typeface="Fira Sans"/>
-                <a:cs typeface="Fira Sans"/>
-                <a:sym typeface="Fira Sans"/>
-              </a:rPr>
-              <a:t>Entrada: Vetores D (n), E (n-1)</a:t>
-            </a:r>
-            <a:endParaRPr sz="1200">
-              <a:latin typeface="Fira Sans"/>
-              <a:ea typeface="Fira Sans"/>
-              <a:cs typeface="Fira Sans"/>
-              <a:sym typeface="Fira Sans"/>
-            </a:endParaRPr>
-          </a:p>
-        </p:txBody>
-      </p:sp>
-      <p:pic>
-        <p:nvPicPr>
-          <p:cNvPr id="152" name="Google Shape;152;p22"/>
-          <p:cNvPicPr preferRelativeResize="0"/>
-          <p:nvPr/>
-        </p:nvPicPr>
-        <p:blipFill>
-          <a:blip r:embed="rId3">
-            <a:alphaModFix/>
-          </a:blip>
-          <a:stretch>
-            <a:fillRect/>
-          </a:stretch>
-        </p:blipFill>
-        <p:spPr>
-          <a:xfrm>
-            <a:off x="768350" y="2046938"/>
-            <a:ext cx="10655302" cy="3941887"/>
-          </a:xfrm>
-          <a:prstGeom prst="rect">
-            <a:avLst/>
-          </a:prstGeom>
-          <a:noFill/>
-          <a:ln>
-            <a:noFill/>
-          </a:ln>
-        </p:spPr>
-      </p:pic>
-    </p:spTree>
-  </p:cSld>
-  <p:clrMapOvr>
-    <a:masterClrMapping/>
-  </p:clrMapOvr>
-  <p:timing>
-    <p:tnLst>
-      <p:par>
-        <p:cTn dur="indefinite" nodeType="tmRoot" restart="never">
-          <p:childTnLst>
-            <p:seq concurrent="1" nextAc="seek">
-              <p:cTn dur="indefinite" id="2" nodeType="mainSeq">
-                <p:childTnLst>
                   <p:par>
                     <p:cTn fill="hold">
                       <p:stCondLst>
@@ -16272,112 +16059,6 @@
                       </p:childTnLst>
                     </p:cTn>
                   </p:par>
-                  <p:par>
-                    <p:cTn fill="hold">
-                      <p:stCondLst>
-                        <p:cond delay="indefinite"/>
-                      </p:stCondLst>
-                      <p:childTnLst>
-                        <p:par>
-                          <p:cTn fill="hold">
-                            <p:stCondLst>
-                              <p:cond delay="0"/>
-                            </p:stCondLst>
-                            <p:childTnLst>
-                              <p:par>
-                                <p:cTn fill="hold" nodeType="clickEffect" presetClass="entr" presetID="10" presetSubtype="0">
-                                  <p:stCondLst>
-                                    <p:cond delay="0"/>
-                                  </p:stCondLst>
-                                  <p:childTnLst>
-                                    <p:set>
-                                      <p:cBhvr>
-                                        <p:cTn dur="1" fill="hold">
-                                          <p:stCondLst>
-                                            <p:cond delay="0"/>
-                                          </p:stCondLst>
-                                        </p:cTn>
-                                        <p:tgtEl>
-                                          <p:spTgt spid="151"/>
-                                        </p:tgtEl>
-                                        <p:attrNameLst>
-                                          <p:attrName>style.visibility</p:attrName>
-                                        </p:attrNameLst>
-                                      </p:cBhvr>
-                                      <p:to>
-                                        <p:strVal val="visible"/>
-                                      </p:to>
-                                    </p:set>
-                                    <p:animEffect filter="fade" transition="in">
-                                      <p:cBhvr>
-                                        <p:cTn dur="1000"/>
-                                        <p:tgtEl>
-                                          <p:spTgt spid="151"/>
-                                        </p:tgtEl>
-                                      </p:cBhvr>
-                                    </p:animEffect>
-                                  </p:childTnLst>
-                                </p:cTn>
-                              </p:par>
-                            </p:childTnLst>
-                          </p:cTn>
-                        </p:par>
-                      </p:childTnLst>
-                    </p:cTn>
-                  </p:par>
-                  <p:par>
-                    <p:cTn fill="hold">
-                      <p:stCondLst>
-                        <p:cond delay="indefinite"/>
-                      </p:stCondLst>
-                      <p:childTnLst>
-                        <p:par>
-                          <p:cTn fill="hold">
-                            <p:stCondLst>
-                              <p:cond delay="0"/>
-                            </p:stCondLst>
-                            <p:childTnLst>
-                              <p:par>
-                                <p:cTn fill="hold" nodeType="clickEffect" presetClass="entr" presetID="10" presetSubtype="0">
-                                  <p:stCondLst>
-                                    <p:cond delay="0"/>
-                                  </p:stCondLst>
-                                  <p:childTnLst>
-                                    <p:set>
-                                      <p:cBhvr>
-                                        <p:cTn dur="1" fill="hold">
-                                          <p:stCondLst>
-                                            <p:cond delay="0"/>
-                                          </p:stCondLst>
-                                        </p:cTn>
-                                        <p:tgtEl>
-                                          <p:spTgt spid="152"/>
-                                        </p:tgtEl>
-                                        <p:attrNameLst>
-                                          <p:attrName>style.visibility</p:attrName>
-                                        </p:attrNameLst>
-                                      </p:cBhvr>
-                                      <p:to>
-                                        <p:strVal val="visible"/>
-                                      </p:to>
-                                    </p:set>
-                                    <p:animEffect filter="fade" transition="in">
-                                      <p:cBhvr>
-                                        <p:cTn dur="1000"/>
-                                        <p:tgtEl>
-                                          <p:spTgt spid="152"/>
-                                        </p:tgtEl>
-                                      </p:cBhvr>
-                                    </p:animEffect>
-                                  </p:childTnLst>
-                                </p:cTn>
-                              </p:par>
-                            </p:childTnLst>
-                          </p:cTn>
-                        </p:par>
-                      </p:childTnLst>
-                    </p:cTn>
-                  </p:par>
                 </p:childTnLst>
               </p:cTn>
               <p:prevCondLst>
@@ -16408,7 +16089,7 @@
   <p:cSld>
     <p:spTree>
       <p:nvGrpSpPr>
-        <p:cNvPr id="157" name="Shape 157"/>
+        <p:cNvPr id="155" name="Shape 155"/>
         <p:cNvGrpSpPr/>
         <p:nvPr/>
       </p:nvGrpSpPr>
@@ -16420,37 +16101,9 @@
           <a:chExt cx="0" cy="0"/>
         </a:xfrm>
       </p:grpSpPr>
-      <p:pic>
-        <p:nvPicPr>
-          <p:cNvPr id="158" name="Google Shape;158;p23"/>
-          <p:cNvPicPr preferRelativeResize="0"/>
-          <p:nvPr/>
-        </p:nvPicPr>
-        <p:blipFill>
-          <a:blip r:embed="rId3">
-            <a:alphaModFix/>
-          </a:blip>
-          <a:stretch>
-            <a:fillRect/>
-          </a:stretch>
-        </p:blipFill>
-        <p:spPr>
-          <a:xfrm>
-            <a:off x="962763" y="1307501"/>
-            <a:ext cx="10266475" cy="3973674"/>
-          </a:xfrm>
-          <a:prstGeom prst="rect">
-            <a:avLst/>
-          </a:prstGeom>
-          <a:noFill/>
-          <a:ln>
-            <a:noFill/>
-          </a:ln>
-        </p:spPr>
-      </p:pic>
       <p:sp>
         <p:nvSpPr>
-          <p:cNvPr id="159" name="Google Shape;159;p23"/>
+          <p:cNvPr id="156" name="Google Shape;156;p23"/>
           <p:cNvSpPr txBox="1"/>
           <p:nvPr>
             <p:ph type="title"/>
@@ -16482,7 +16135,7 @@
             </a:pPr>
             <a:r>
               <a:rPr lang="pt-BR"/>
-              <a:t>Comparação</a:t>
+              <a:t>Caso Tridiagonal</a:t>
             </a:r>
             <a:endParaRPr/>
           </a:p>
@@ -16490,7 +16143,7 @@
       </p:sp>
       <p:sp>
         <p:nvSpPr>
-          <p:cNvPr id="160" name="Google Shape;160;p23"/>
+          <p:cNvPr id="157" name="Google Shape;157;p23"/>
           <p:cNvSpPr txBox="1"/>
           <p:nvPr>
             <p:ph idx="12" type="sldNum"/>
@@ -16518,10 +16171,6 @@
               <a:spcAft>
                 <a:spcPts val="0"/>
               </a:spcAft>
-              <a:buClr>
-                <a:srgbClr val="000000"/>
-              </a:buClr>
-              <a:buFont typeface="Arial"/>
               <a:buNone/>
             </a:pPr>
             <a:fld id="{00000000-1234-1234-1234-123412341234}" type="slidenum">
@@ -16534,14 +16183,14 @@
       </p:sp>
       <p:sp>
         <p:nvSpPr>
-          <p:cNvPr id="161" name="Google Shape;161;p23"/>
+          <p:cNvPr id="158" name="Google Shape;158;p23"/>
           <p:cNvSpPr txBox="1"/>
           <p:nvPr/>
         </p:nvSpPr>
         <p:spPr>
           <a:xfrm>
-            <a:off x="858937" y="5567450"/>
-            <a:ext cx="10436100" cy="400200"/>
+            <a:off x="951638" y="1056750"/>
+            <a:ext cx="5426100" cy="923400"/>
           </a:xfrm>
           <a:prstGeom prst="rect">
             <a:avLst/>
@@ -16557,27 +16206,136 @@
           </a:bodyPr>
           <a:lstStyle/>
           <a:p>
-            <a:pPr indent="-317500" lvl="0" marL="457200" rtl="0" algn="l">
-              <a:spcBef>
-                <a:spcPts val="0"/>
-              </a:spcBef>
-              <a:spcAft>
-                <a:spcPts val="0"/>
-              </a:spcAft>
-              <a:buSzPts val="1400"/>
-              <a:buFont typeface="Fira Sans"/>
-              <a:buChar char="●"/>
+            <a:pPr indent="0" lvl="0" marL="457200" rtl="0" algn="l">
+              <a:spcBef>
+                <a:spcPts val="0"/>
+              </a:spcBef>
+              <a:spcAft>
+                <a:spcPts val="0"/>
+              </a:spcAft>
+              <a:buNone/>
             </a:pPr>
             <a:r>
-              <a:rPr lang="pt-BR">
+              <a:rPr lang="pt-BR" sz="1200">
                 <a:latin typeface="Fira Sans"/>
                 <a:ea typeface="Fira Sans"/>
                 <a:cs typeface="Fira Sans"/>
                 <a:sym typeface="Fira Sans"/>
               </a:rPr>
-              <a:t>Conclusão: Altamente recomendável utilizar o algoritmo certo para o tipo de matriz que está trabalhando</a:t>
+              <a:t>Assimétrico:</a:t>
             </a:r>
-            <a:endParaRPr>
+            <a:endParaRPr sz="1200">
+              <a:latin typeface="Fira Sans"/>
+              <a:ea typeface="Fira Sans"/>
+              <a:cs typeface="Fira Sans"/>
+              <a:sym typeface="Fira Sans"/>
+            </a:endParaRPr>
+          </a:p>
+          <a:p>
+            <a:pPr indent="-304800" lvl="0" marL="914400" rtl="0" algn="l">
+              <a:spcBef>
+                <a:spcPts val="0"/>
+              </a:spcBef>
+              <a:spcAft>
+                <a:spcPts val="0"/>
+              </a:spcAft>
+              <a:buClr>
+                <a:schemeClr val="dk1"/>
+              </a:buClr>
+              <a:buSzPts val="1200"/>
+              <a:buFont typeface="Fira Sans"/>
+              <a:buChar char="●"/>
+            </a:pPr>
+            <a:r>
+              <a:rPr lang="pt-BR" sz="1200">
+                <a:solidFill>
+                  <a:schemeClr val="dk1"/>
+                </a:solidFill>
+                <a:latin typeface="Fira Sans"/>
+                <a:ea typeface="Fira Sans"/>
+                <a:cs typeface="Fira Sans"/>
+                <a:sym typeface="Fira Sans"/>
+              </a:rPr>
+              <a:t>Função: dgtsv</a:t>
+            </a:r>
+            <a:endParaRPr sz="1200">
+              <a:solidFill>
+                <a:schemeClr val="dk1"/>
+              </a:solidFill>
+              <a:latin typeface="Fira Sans"/>
+              <a:ea typeface="Fira Sans"/>
+              <a:cs typeface="Fira Sans"/>
+              <a:sym typeface="Fira Sans"/>
+            </a:endParaRPr>
+          </a:p>
+          <a:p>
+            <a:pPr indent="-304800" lvl="0" marL="914400" rtl="0" algn="l">
+              <a:spcBef>
+                <a:spcPts val="0"/>
+              </a:spcBef>
+              <a:spcAft>
+                <a:spcPts val="0"/>
+              </a:spcAft>
+              <a:buClr>
+                <a:schemeClr val="dk1"/>
+              </a:buClr>
+              <a:buSzPts val="1200"/>
+              <a:buFont typeface="Fira Sans"/>
+              <a:buChar char="●"/>
+            </a:pPr>
+            <a:r>
+              <a:rPr lang="pt-BR" sz="1200">
+                <a:solidFill>
+                  <a:schemeClr val="dk1"/>
+                </a:solidFill>
+                <a:latin typeface="Fira Sans"/>
+                <a:ea typeface="Fira Sans"/>
+                <a:cs typeface="Fira Sans"/>
+                <a:sym typeface="Fira Sans"/>
+              </a:rPr>
+              <a:t>Requerimento: Matriz Tridiagonal</a:t>
+            </a:r>
+            <a:endParaRPr sz="1200">
+              <a:solidFill>
+                <a:schemeClr val="dk1"/>
+              </a:solidFill>
+              <a:latin typeface="Fira Sans"/>
+              <a:ea typeface="Fira Sans"/>
+              <a:cs typeface="Fira Sans"/>
+              <a:sym typeface="Fira Sans"/>
+            </a:endParaRPr>
+          </a:p>
+          <a:p>
+            <a:pPr indent="-304800" lvl="0" marL="914400" rtl="0" algn="l">
+              <a:spcBef>
+                <a:spcPts val="0"/>
+              </a:spcBef>
+              <a:spcAft>
+                <a:spcPts val="0"/>
+              </a:spcAft>
+              <a:buClr>
+                <a:schemeClr val="dk1"/>
+              </a:buClr>
+              <a:buSzPts val="1200"/>
+              <a:buFont typeface="Fira Sans"/>
+              <a:buChar char="●"/>
+            </a:pPr>
+            <a:r>
+              <a:rPr lang="pt-BR" sz="1200">
+                <a:solidFill>
+                  <a:schemeClr val="dk1"/>
+                </a:solidFill>
+                <a:latin typeface="Fira Sans"/>
+                <a:ea typeface="Fira Sans"/>
+                <a:cs typeface="Fira Sans"/>
+                <a:sym typeface="Fira Sans"/>
+              </a:rPr>
+              <a:t>Entrada: Vetores DL (n-1) , D (n), DU (n-1)</a:t>
+            </a:r>
+            <a:endParaRPr sz="1200">
+              <a:solidFill>
+                <a:schemeClr val="dk1"/>
+              </a:solidFill>
               <a:latin typeface="Fira Sans"/>
               <a:ea typeface="Fira Sans"/>
               <a:cs typeface="Fira Sans"/>
@@ -16586,6 +16344,194 @@
           </a:p>
         </p:txBody>
       </p:sp>
+      <p:sp>
+        <p:nvSpPr>
+          <p:cNvPr id="159" name="Google Shape;159;p23"/>
+          <p:cNvSpPr txBox="1"/>
+          <p:nvPr/>
+        </p:nvSpPr>
+        <p:spPr>
+          <a:xfrm>
+            <a:off x="6726313" y="1056750"/>
+            <a:ext cx="5426100" cy="923400"/>
+          </a:xfrm>
+          <a:prstGeom prst="rect">
+            <a:avLst/>
+          </a:prstGeom>
+          <a:noFill/>
+          <a:ln>
+            <a:noFill/>
+          </a:ln>
+        </p:spPr>
+        <p:txBody>
+          <a:bodyPr anchorCtr="0" anchor="t" bIns="91425" lIns="91425" spcFirstLastPara="1" rIns="91425" wrap="square" tIns="91425">
+            <a:spAutoFit/>
+          </a:bodyPr>
+          <a:lstStyle/>
+          <a:p>
+            <a:pPr indent="0" lvl="0" marL="457200" rtl="0" algn="l">
+              <a:spcBef>
+                <a:spcPts val="0"/>
+              </a:spcBef>
+              <a:spcAft>
+                <a:spcPts val="0"/>
+              </a:spcAft>
+              <a:buNone/>
+            </a:pPr>
+            <a:r>
+              <a:rPr lang="pt-BR" sz="1200">
+                <a:latin typeface="Fira Sans"/>
+                <a:ea typeface="Fira Sans"/>
+                <a:cs typeface="Fira Sans"/>
+                <a:sym typeface="Fira Sans"/>
+              </a:rPr>
+              <a:t>Simétrico:</a:t>
+            </a:r>
+            <a:endParaRPr sz="1200">
+              <a:latin typeface="Fira Sans"/>
+              <a:ea typeface="Fira Sans"/>
+              <a:cs typeface="Fira Sans"/>
+              <a:sym typeface="Fira Sans"/>
+            </a:endParaRPr>
+          </a:p>
+          <a:p>
+            <a:pPr indent="-304800" lvl="0" marL="914400" rtl="0" algn="l">
+              <a:spcBef>
+                <a:spcPts val="0"/>
+              </a:spcBef>
+              <a:spcAft>
+                <a:spcPts val="0"/>
+              </a:spcAft>
+              <a:buClr>
+                <a:schemeClr val="dk1"/>
+              </a:buClr>
+              <a:buSzPts val="1200"/>
+              <a:buFont typeface="Fira Sans"/>
+              <a:buChar char="●"/>
+            </a:pPr>
+            <a:r>
+              <a:rPr lang="pt-BR" sz="1200">
+                <a:solidFill>
+                  <a:schemeClr val="dk1"/>
+                </a:solidFill>
+                <a:latin typeface="Fira Sans"/>
+                <a:ea typeface="Fira Sans"/>
+                <a:cs typeface="Fira Sans"/>
+                <a:sym typeface="Fira Sans"/>
+              </a:rPr>
+              <a:t>Função: dptsv</a:t>
+            </a:r>
+            <a:endParaRPr sz="1200">
+              <a:solidFill>
+                <a:schemeClr val="dk1"/>
+              </a:solidFill>
+              <a:latin typeface="Fira Sans"/>
+              <a:ea typeface="Fira Sans"/>
+              <a:cs typeface="Fira Sans"/>
+              <a:sym typeface="Fira Sans"/>
+            </a:endParaRPr>
+          </a:p>
+          <a:p>
+            <a:pPr indent="-304800" lvl="0" marL="914400" rtl="0" algn="l">
+              <a:spcBef>
+                <a:spcPts val="0"/>
+              </a:spcBef>
+              <a:spcAft>
+                <a:spcPts val="0"/>
+              </a:spcAft>
+              <a:buClr>
+                <a:schemeClr val="dk1"/>
+              </a:buClr>
+              <a:buSzPts val="1200"/>
+              <a:buFont typeface="Fira Sans"/>
+              <a:buChar char="●"/>
+            </a:pPr>
+            <a:r>
+              <a:rPr lang="pt-BR" sz="1200">
+                <a:solidFill>
+                  <a:schemeClr val="dk1"/>
+                </a:solidFill>
+                <a:latin typeface="Fira Sans"/>
+                <a:ea typeface="Fira Sans"/>
+                <a:cs typeface="Fira Sans"/>
+                <a:sym typeface="Fira Sans"/>
+              </a:rPr>
+              <a:t>Requerimento: Matriz Tridiagonal simétrica positiva definida</a:t>
+            </a:r>
+            <a:endParaRPr sz="1200">
+              <a:solidFill>
+                <a:schemeClr val="dk1"/>
+              </a:solidFill>
+              <a:latin typeface="Fira Sans"/>
+              <a:ea typeface="Fira Sans"/>
+              <a:cs typeface="Fira Sans"/>
+              <a:sym typeface="Fira Sans"/>
+            </a:endParaRPr>
+          </a:p>
+          <a:p>
+            <a:pPr indent="-304800" lvl="0" marL="914400" rtl="0" algn="l">
+              <a:spcBef>
+                <a:spcPts val="0"/>
+              </a:spcBef>
+              <a:spcAft>
+                <a:spcPts val="0"/>
+              </a:spcAft>
+              <a:buClr>
+                <a:schemeClr val="dk1"/>
+              </a:buClr>
+              <a:buSzPts val="1200"/>
+              <a:buFont typeface="Fira Sans"/>
+              <a:buChar char="●"/>
+            </a:pPr>
+            <a:r>
+              <a:rPr lang="pt-BR" sz="1200">
+                <a:solidFill>
+                  <a:schemeClr val="dk1"/>
+                </a:solidFill>
+                <a:latin typeface="Fira Sans"/>
+                <a:ea typeface="Fira Sans"/>
+                <a:cs typeface="Fira Sans"/>
+                <a:sym typeface="Fira Sans"/>
+              </a:rPr>
+              <a:t>Entrada: Vetores D (n), E (n-1)</a:t>
+            </a:r>
+            <a:endParaRPr sz="1200">
+              <a:latin typeface="Fira Sans"/>
+              <a:ea typeface="Fira Sans"/>
+              <a:cs typeface="Fira Sans"/>
+              <a:sym typeface="Fira Sans"/>
+            </a:endParaRPr>
+          </a:p>
+        </p:txBody>
+      </p:sp>
+      <p:pic>
+        <p:nvPicPr>
+          <p:cNvPr id="160" name="Google Shape;160;p23"/>
+          <p:cNvPicPr preferRelativeResize="0"/>
+          <p:nvPr/>
+        </p:nvPicPr>
+        <p:blipFill>
+          <a:blip r:embed="rId3">
+            <a:alphaModFix/>
+          </a:blip>
+          <a:stretch>
+            <a:fillRect/>
+          </a:stretch>
+        </p:blipFill>
+        <p:spPr>
+          <a:xfrm>
+            <a:off x="768350" y="2046938"/>
+            <a:ext cx="10655302" cy="3941887"/>
+          </a:xfrm>
+          <a:prstGeom prst="rect">
+            <a:avLst/>
+          </a:prstGeom>
+          <a:noFill/>
+          <a:ln>
+            <a:noFill/>
+          </a:ln>
+        </p:spPr>
+      </p:pic>
     </p:spTree>
   </p:cSld>
   <p:clrMapOvr>
@@ -16678,7 +16624,7 @@
                                           </p:stCondLst>
                                         </p:cTn>
                                         <p:tgtEl>
-                                          <p:spTgt spid="161"/>
+                                          <p:spTgt spid="159"/>
                                         </p:tgtEl>
                                         <p:attrNameLst>
                                           <p:attrName>style.visibility</p:attrName>
@@ -16692,7 +16638,387 @@
                                       <p:cBhvr>
                                         <p:cTn dur="1000"/>
                                         <p:tgtEl>
-                                          <p:spTgt spid="161"/>
+                                          <p:spTgt spid="159"/>
+                                        </p:tgtEl>
+                                      </p:cBhvr>
+                                    </p:animEffect>
+                                  </p:childTnLst>
+                                </p:cTn>
+                              </p:par>
+                            </p:childTnLst>
+                          </p:cTn>
+                        </p:par>
+                      </p:childTnLst>
+                    </p:cTn>
+                  </p:par>
+                  <p:par>
+                    <p:cTn fill="hold">
+                      <p:stCondLst>
+                        <p:cond delay="indefinite"/>
+                      </p:stCondLst>
+                      <p:childTnLst>
+                        <p:par>
+                          <p:cTn fill="hold">
+                            <p:stCondLst>
+                              <p:cond delay="0"/>
+                            </p:stCondLst>
+                            <p:childTnLst>
+                              <p:par>
+                                <p:cTn fill="hold" nodeType="clickEffect" presetClass="entr" presetID="10" presetSubtype="0">
+                                  <p:stCondLst>
+                                    <p:cond delay="0"/>
+                                  </p:stCondLst>
+                                  <p:childTnLst>
+                                    <p:set>
+                                      <p:cBhvr>
+                                        <p:cTn dur="1" fill="hold">
+                                          <p:stCondLst>
+                                            <p:cond delay="0"/>
+                                          </p:stCondLst>
+                                        </p:cTn>
+                                        <p:tgtEl>
+                                          <p:spTgt spid="160"/>
+                                        </p:tgtEl>
+                                        <p:attrNameLst>
+                                          <p:attrName>style.visibility</p:attrName>
+                                        </p:attrNameLst>
+                                      </p:cBhvr>
+                                      <p:to>
+                                        <p:strVal val="visible"/>
+                                      </p:to>
+                                    </p:set>
+                                    <p:animEffect filter="fade" transition="in">
+                                      <p:cBhvr>
+                                        <p:cTn dur="1000"/>
+                                        <p:tgtEl>
+                                          <p:spTgt spid="160"/>
+                                        </p:tgtEl>
+                                      </p:cBhvr>
+                                    </p:animEffect>
+                                  </p:childTnLst>
+                                </p:cTn>
+                              </p:par>
+                            </p:childTnLst>
+                          </p:cTn>
+                        </p:par>
+                      </p:childTnLst>
+                    </p:cTn>
+                  </p:par>
+                </p:childTnLst>
+              </p:cTn>
+              <p:prevCondLst>
+                <p:cond evt="onPrev">
+                  <p:tgtEl>
+                    <p:sldTgt/>
+                  </p:tgtEl>
+                </p:cond>
+              </p:prevCondLst>
+              <p:nextCondLst>
+                <p:cond evt="onNext">
+                  <p:tgtEl>
+                    <p:sldTgt/>
+                  </p:tgtEl>
+                </p:cond>
+              </p:nextCondLst>
+            </p:seq>
+          </p:childTnLst>
+        </p:cTn>
+      </p:par>
+    </p:tnLst>
+  </p:timing>
+</p:sld>
+</file>
+
+<file path=ppt/slides/slide8.xml><?xml version="1.0" encoding="utf-8"?>
+<p:sld xmlns:a="http://schemas.openxmlformats.org/drawingml/2006/main" xmlns:r="http://schemas.openxmlformats.org/officeDocument/2006/relationships" xmlns:mc="http://schemas.openxmlformats.org/markup-compatibility/2006" xmlns:mv="urn:schemas-microsoft-com:mac:vml" xmlns:p="http://schemas.openxmlformats.org/presentationml/2006/main" xmlns:c="http://schemas.openxmlformats.org/drawingml/2006/chart" xmlns:dgm="http://schemas.openxmlformats.org/drawingml/2006/diagram" xmlns:o="urn:schemas-microsoft-com:office:office" xmlns:v="urn:schemas-microsoft-com:vml" xmlns:pvml="urn:schemas-microsoft-com:office:powerpoint" xmlns:com="http://schemas.openxmlformats.org/drawingml/2006/compatibility" xmlns:p14="http://schemas.microsoft.com/office/powerpoint/2010/main" xmlns:p15="http://schemas.microsoft.com/office/powerpoint/2012/main" xmlns:ahyp="http://schemas.microsoft.com/office/drawing/2018/hyperlinkcolor">
+  <p:cSld>
+    <p:spTree>
+      <p:nvGrpSpPr>
+        <p:cNvPr id="165" name="Shape 165"/>
+        <p:cNvGrpSpPr/>
+        <p:nvPr/>
+      </p:nvGrpSpPr>
+      <p:grpSpPr>
+        <a:xfrm>
+          <a:off x="0" y="0"/>
+          <a:ext cx="0" cy="0"/>
+          <a:chOff x="0" y="0"/>
+          <a:chExt cx="0" cy="0"/>
+        </a:xfrm>
+      </p:grpSpPr>
+      <p:pic>
+        <p:nvPicPr>
+          <p:cNvPr id="166" name="Google Shape;166;p24"/>
+          <p:cNvPicPr preferRelativeResize="0"/>
+          <p:nvPr/>
+        </p:nvPicPr>
+        <p:blipFill>
+          <a:blip r:embed="rId3">
+            <a:alphaModFix/>
+          </a:blip>
+          <a:stretch>
+            <a:fillRect/>
+          </a:stretch>
+        </p:blipFill>
+        <p:spPr>
+          <a:xfrm>
+            <a:off x="962763" y="1307501"/>
+            <a:ext cx="10266475" cy="3973674"/>
+          </a:xfrm>
+          <a:prstGeom prst="rect">
+            <a:avLst/>
+          </a:prstGeom>
+          <a:noFill/>
+          <a:ln>
+            <a:noFill/>
+          </a:ln>
+        </p:spPr>
+      </p:pic>
+      <p:sp>
+        <p:nvSpPr>
+          <p:cNvPr id="167" name="Google Shape;167;p24"/>
+          <p:cNvSpPr txBox="1"/>
+          <p:nvPr>
+            <p:ph type="title"/>
+          </p:nvPr>
+        </p:nvSpPr>
+        <p:spPr>
+          <a:xfrm>
+            <a:off x="1155469" y="66183"/>
+            <a:ext cx="10914600" cy="1334400"/>
+          </a:xfrm>
+          <a:prstGeom prst="rect">
+            <a:avLst/>
+          </a:prstGeom>
+        </p:spPr>
+        <p:txBody>
+          <a:bodyPr anchorCtr="0" anchor="ctr" bIns="45700" lIns="91425" spcFirstLastPara="1" rIns="91425" wrap="square" tIns="45700">
+            <a:normAutofit/>
+          </a:bodyPr>
+          <a:lstStyle/>
+          <a:p>
+            <a:pPr indent="0" lvl="0" marL="0" rtl="0" algn="l">
+              <a:spcBef>
+                <a:spcPts val="0"/>
+              </a:spcBef>
+              <a:spcAft>
+                <a:spcPts val="0"/>
+              </a:spcAft>
+              <a:buNone/>
+            </a:pPr>
+            <a:r>
+              <a:rPr lang="pt-BR"/>
+              <a:t>Comparação</a:t>
+            </a:r>
+            <a:endParaRPr/>
+          </a:p>
+        </p:txBody>
+      </p:sp>
+      <p:sp>
+        <p:nvSpPr>
+          <p:cNvPr id="168" name="Google Shape;168;p24"/>
+          <p:cNvSpPr txBox="1"/>
+          <p:nvPr>
+            <p:ph idx="12" type="sldNum"/>
+          </p:nvPr>
+        </p:nvSpPr>
+        <p:spPr>
+          <a:xfrm>
+            <a:off x="8801100" y="6350138"/>
+            <a:ext cx="2743200" cy="365100"/>
+          </a:xfrm>
+          <a:prstGeom prst="rect">
+            <a:avLst/>
+          </a:prstGeom>
+        </p:spPr>
+        <p:txBody>
+          <a:bodyPr anchorCtr="0" anchor="ctr" bIns="45700" lIns="91425" spcFirstLastPara="1" rIns="91425" wrap="square" tIns="45700">
+            <a:noAutofit/>
+          </a:bodyPr>
+          <a:lstStyle/>
+          <a:p>
+            <a:pPr indent="0" lvl="0" marL="0" rtl="0" algn="r">
+              <a:spcBef>
+                <a:spcPts val="0"/>
+              </a:spcBef>
+              <a:spcAft>
+                <a:spcPts val="0"/>
+              </a:spcAft>
+              <a:buClr>
+                <a:srgbClr val="000000"/>
+              </a:buClr>
+              <a:buFont typeface="Arial"/>
+              <a:buNone/>
+            </a:pPr>
+            <a:fld id="{00000000-1234-1234-1234-123412341234}" type="slidenum">
+              <a:rPr lang="pt-BR"/>
+              <a:t>‹#›</a:t>
+            </a:fld>
+            <a:endParaRPr sz="3200"/>
+          </a:p>
+        </p:txBody>
+      </p:sp>
+      <p:sp>
+        <p:nvSpPr>
+          <p:cNvPr id="169" name="Google Shape;169;p24"/>
+          <p:cNvSpPr txBox="1"/>
+          <p:nvPr/>
+        </p:nvSpPr>
+        <p:spPr>
+          <a:xfrm>
+            <a:off x="858937" y="5567450"/>
+            <a:ext cx="10436100" cy="400200"/>
+          </a:xfrm>
+          <a:prstGeom prst="rect">
+            <a:avLst/>
+          </a:prstGeom>
+          <a:noFill/>
+          <a:ln>
+            <a:noFill/>
+          </a:ln>
+        </p:spPr>
+        <p:txBody>
+          <a:bodyPr anchorCtr="0" anchor="t" bIns="91425" lIns="91425" spcFirstLastPara="1" rIns="91425" wrap="square" tIns="91425">
+            <a:spAutoFit/>
+          </a:bodyPr>
+          <a:lstStyle/>
+          <a:p>
+            <a:pPr indent="-317500" lvl="0" marL="457200" rtl="0" algn="l">
+              <a:spcBef>
+                <a:spcPts val="0"/>
+              </a:spcBef>
+              <a:spcAft>
+                <a:spcPts val="0"/>
+              </a:spcAft>
+              <a:buSzPts val="1400"/>
+              <a:buFont typeface="Fira Sans"/>
+              <a:buChar char="●"/>
+            </a:pPr>
+            <a:r>
+              <a:rPr lang="pt-BR">
+                <a:latin typeface="Fira Sans"/>
+                <a:ea typeface="Fira Sans"/>
+                <a:cs typeface="Fira Sans"/>
+                <a:sym typeface="Fira Sans"/>
+              </a:rPr>
+              <a:t>Conclusão: Altamente recomendável utilizar o algoritmo certo para o tipo de matriz que está trabalhando</a:t>
+            </a:r>
+            <a:endParaRPr>
+              <a:latin typeface="Fira Sans"/>
+              <a:ea typeface="Fira Sans"/>
+              <a:cs typeface="Fira Sans"/>
+              <a:sym typeface="Fira Sans"/>
+            </a:endParaRPr>
+          </a:p>
+        </p:txBody>
+      </p:sp>
+    </p:spTree>
+  </p:cSld>
+  <p:clrMapOvr>
+    <a:masterClrMapping/>
+  </p:clrMapOvr>
+  <p:timing>
+    <p:tnLst>
+      <p:par>
+        <p:cTn dur="indefinite" nodeType="tmRoot" restart="never">
+          <p:childTnLst>
+            <p:seq concurrent="1" nextAc="seek">
+              <p:cTn dur="indefinite" id="2" nodeType="mainSeq">
+                <p:childTnLst>
+                  <p:par>
+                    <p:cTn fill="hold">
+                      <p:stCondLst>
+                        <p:cond delay="indefinite"/>
+                      </p:stCondLst>
+                      <p:childTnLst>
+                        <p:par>
+                          <p:cTn fill="hold">
+                            <p:stCondLst>
+                              <p:cond delay="0"/>
+                            </p:stCondLst>
+                            <p:childTnLst>
+                              <p:par>
+                                <p:cTn fill="hold" nodeType="clickEffect" presetClass="entr" presetID="10" presetSubtype="0">
+                                  <p:stCondLst>
+                                    <p:cond delay="0"/>
+                                  </p:stCondLst>
+                                  <p:childTnLst>
+                                    <p:set>
+                                      <p:cBhvr>
+                                        <p:cTn dur="1" fill="hold">
+                                          <p:stCondLst>
+                                            <p:cond delay="0"/>
+                                          </p:stCondLst>
+                                        </p:cTn>
+                                        <p:tgtEl>
+                                          <p:spTgt spid="166"/>
+                                        </p:tgtEl>
+                                        <p:attrNameLst>
+                                          <p:attrName>style.visibility</p:attrName>
+                                        </p:attrNameLst>
+                                      </p:cBhvr>
+                                      <p:to>
+                                        <p:strVal val="visible"/>
+                                      </p:to>
+                                    </p:set>
+                                    <p:animEffect filter="fade" transition="in">
+                                      <p:cBhvr>
+                                        <p:cTn dur="1000"/>
+                                        <p:tgtEl>
+                                          <p:spTgt spid="166"/>
+                                        </p:tgtEl>
+                                      </p:cBhvr>
+                                    </p:animEffect>
+                                  </p:childTnLst>
+                                </p:cTn>
+                              </p:par>
+                            </p:childTnLst>
+                          </p:cTn>
+                        </p:par>
+                      </p:childTnLst>
+                    </p:cTn>
+                  </p:par>
+                  <p:par>
+                    <p:cTn fill="hold">
+                      <p:stCondLst>
+                        <p:cond delay="indefinite"/>
+                      </p:stCondLst>
+                      <p:childTnLst>
+                        <p:par>
+                          <p:cTn fill="hold">
+                            <p:stCondLst>
+                              <p:cond delay="0"/>
+                            </p:stCondLst>
+                            <p:childTnLst>
+                              <p:par>
+                                <p:cTn fill="hold" nodeType="clickEffect" presetClass="entr" presetID="10" presetSubtype="0">
+                                  <p:stCondLst>
+                                    <p:cond delay="0"/>
+                                  </p:stCondLst>
+                                  <p:childTnLst>
+                                    <p:set>
+                                      <p:cBhvr>
+                                        <p:cTn dur="1" fill="hold">
+                                          <p:stCondLst>
+                                            <p:cond delay="0"/>
+                                          </p:stCondLst>
+                                        </p:cTn>
+                                        <p:tgtEl>
+                                          <p:spTgt spid="169"/>
+                                        </p:tgtEl>
+                                        <p:attrNameLst>
+                                          <p:attrName>style.visibility</p:attrName>
+                                        </p:attrNameLst>
+                                      </p:cBhvr>
+                                      <p:to>
+                                        <p:strVal val="visible"/>
+                                      </p:to>
+                                    </p:set>
+                                    <p:animEffect filter="fade" transition="in">
+                                      <p:cBhvr>
+                                        <p:cTn dur="1000"/>
+                                        <p:tgtEl>
+                                          <p:spTgt spid="169"/>
                                         </p:tgtEl>
                                       </p:cBhvr>
                                     </p:animEffect>

</xml_diff>